<commit_message>
Update Sprint 3 review presentation
</commit_message>
<xml_diff>
--- a/02_Backend/!_Docs/INF4_SYP_Gruppe1_Sprint3_Review.pptx
+++ b/02_Backend/!_Docs/INF4_SYP_Gruppe1_Sprint3_Review.pptx
@@ -9207,13 +9207,13 @@
   <p:clrMapOvr>
     <a:masterClrMapping/>
   </p:clrMapOvr>
-  <mc:AlternateContent xmlns:mc="http://schemas.openxmlformats.org/markup-compatibility/2006">
-    <mc:Choice xmlns:p14="http://schemas.microsoft.com/office/powerpoint/2010/main" Requires="p14">
+  <mc:AlternateContent xmlns:mc="http://schemas.openxmlformats.org/markup-compatibility/2006" xmlns:p14="http://schemas.microsoft.com/office/powerpoint/2010/main">
+    <mc:Choice Requires="p14">
       <p:transition spd="med" p14:dur="700">
         <p:fade/>
       </p:transition>
     </mc:Choice>
-    <mc:Fallback>
+    <mc:Fallback xmlns="">
       <p:transition spd="med">
         <p:fade/>
       </p:transition>
@@ -10900,13 +10900,13 @@
   <p:clrMapOvr>
     <a:masterClrMapping/>
   </p:clrMapOvr>
-  <mc:AlternateContent xmlns:mc="http://schemas.openxmlformats.org/markup-compatibility/2006">
-    <mc:Choice xmlns:p14="http://schemas.microsoft.com/office/powerpoint/2010/main" Requires="p14">
+  <mc:AlternateContent xmlns:mc="http://schemas.openxmlformats.org/markup-compatibility/2006" xmlns:p14="http://schemas.microsoft.com/office/powerpoint/2010/main">
+    <mc:Choice Requires="p14">
       <p:transition spd="med" p14:dur="700">
         <p:fade/>
       </p:transition>
     </mc:Choice>
-    <mc:Fallback>
+    <mc:Fallback xmlns="">
       <p:transition spd="med">
         <p:fade/>
       </p:transition>
@@ -12581,7 +12581,13 @@
             </a:pPr>
             <a:r>
               <a:rPr lang="de-AT" sz="2400" b="1" dirty="0"/>
-              <a:t>Ziel des Spikes</a:t>
+              <a:t>Timeboxing</a:t>
+            </a:r>
+          </a:p>
+          <a:p>
+            <a:r>
+              <a:rPr lang="de-AT" sz="1900" dirty="0"/>
+              <a:t>3 Wochen für Algorithmus zum Abfahren der Strecke, Sammeln der Daten (Sensor) und Karten-Mapping  </a:t>
             </a:r>
           </a:p>
           <a:p>
@@ -12589,39 +12595,80 @@
               <a:buNone/>
             </a:pPr>
             <a:r>
-              <a:rPr lang="de-AT" sz="2200" b="1" dirty="0"/>
-              <a:t>Timeboxing</a:t>
-            </a:r>
+              <a:rPr lang="de-AT" sz="2400" b="1" dirty="0"/>
+              <a:t>Prototypen / Variantenbildung</a:t>
+            </a:r>
+          </a:p>
+          <a:p>
+            <a:r>
+              <a:rPr lang="de-AT" sz="1900" b="1" dirty="0"/>
+              <a:t> </a:t>
+            </a:r>
+            <a:r>
+              <a:rPr lang="de-AT" sz="1900" dirty="0"/>
+              <a:t>BFS (Breitensuche)</a:t>
+            </a:r>
+          </a:p>
+          <a:p>
+            <a:r>
+              <a:rPr lang="de-AT" sz="1900" dirty="0"/>
+              <a:t> DFS (Tiefensuche)</a:t>
+            </a:r>
+          </a:p>
+          <a:p>
+            <a:r>
+              <a:rPr lang="de-AT" sz="1900" dirty="0"/>
+              <a:t> A</a:t>
+            </a:r>
+            <a:r>
+              <a:rPr lang="de-DE" sz="1900" dirty="0"/>
+              <a:t>(A-Stern)</a:t>
+            </a:r>
+            <a:r>
+              <a:rPr lang="de-AT" sz="1900" dirty="0"/>
+              <a:t>*</a:t>
+            </a:r>
+          </a:p>
+          <a:p>
+            <a:r>
+              <a:rPr lang="de-AT" sz="1900" dirty="0"/>
+              <a:t> </a:t>
+            </a:r>
+            <a:r>
+              <a:rPr lang="de-DE" sz="1900" dirty="0"/>
+              <a:t>Neander Förmig</a:t>
+            </a:r>
+            <a:endParaRPr lang="de-AT" sz="1900" b="1" dirty="0"/>
           </a:p>
           <a:p>
             <a:pPr marL="0" indent="0">
               <a:buNone/>
             </a:pPr>
-            <a:endParaRPr lang="de-AT" sz="2400" b="1" dirty="0"/>
+            <a:r>
+              <a:rPr lang="de-AT" sz="2400" b="1" dirty="0"/>
+              <a:t>Lösungsansatze</a:t>
+            </a:r>
+          </a:p>
+          <a:p>
+            <a:r>
+              <a:rPr lang="de-AT" sz="1900" dirty="0"/>
+              <a:t>Alte Ansätze wurden verworfen -&gt; zu kompliziert</a:t>
+            </a:r>
+          </a:p>
+          <a:p>
+            <a:r>
+              <a:rPr lang="de-AT" sz="1900" dirty="0"/>
+              <a:t>Herr Prof. Aigner-Ansatz verwendet -&gt; SLAM-Ansatz</a:t>
+            </a:r>
           </a:p>
           <a:p>
             <a:pPr marL="0" indent="0">
               <a:buNone/>
             </a:pPr>
-            <a:r>
-              <a:rPr lang="de-AT" sz="2400" b="1" dirty="0"/>
-              <a:t>Prototypen / Variantenbildung</a:t>
-            </a:r>
-          </a:p>
-          <a:p>
-            <a:pPr marL="0" indent="0">
-              <a:buNone/>
-            </a:pPr>
-            <a:endParaRPr lang="de-AT" sz="2400" b="1" dirty="0"/>
-          </a:p>
-          <a:p>
-            <a:pPr marL="0" indent="0">
-              <a:buNone/>
-            </a:pPr>
-            <a:r>
-              <a:rPr lang="de-AT" sz="2400" b="1" dirty="0"/>
-              <a:t>Lösungsansatze</a:t>
-            </a:r>
+            <a:endParaRPr lang="de-AT" sz="2000" dirty="0"/>
+          </a:p>
+          <a:p>
+            <a:endParaRPr lang="de-AT" sz="2000" dirty="0"/>
           </a:p>
           <a:p>
             <a:pPr marL="0" indent="0">
@@ -13524,6 +13571,21 @@
 </file>
 
 <file path=customXml/item1.xml><?xml version="1.0" encoding="utf-8"?>
+<?mso-contentType ?>
+<FormTemplates xmlns="http://schemas.microsoft.com/sharepoint/v3/contenttype/forms">
+  <Display>DocumentLibraryForm</Display>
+  <Edit>DocumentLibraryForm</Edit>
+  <New>DocumentLibraryForm</New>
+</FormTemplates>
+</file>
+
+<file path=customXml/item2.xml><?xml version="1.0" encoding="utf-8"?>
+<p:properties xmlns:p="http://schemas.microsoft.com/office/2006/metadata/properties" xmlns:xsi="http://www.w3.org/2001/XMLSchema-instance" xmlns:pc="http://schemas.microsoft.com/office/infopath/2007/PartnerControls">
+  <documentManagement/>
+</p:properties>
+</file>
+
+<file path=customXml/item3.xml><?xml version="1.0" encoding="utf-8"?>
 <ct:contentTypeSchema xmlns:ct="http://schemas.microsoft.com/office/2006/metadata/contentType" xmlns:ma="http://schemas.microsoft.com/office/2006/metadata/properties/metaAttributes" ct:_="" ma:_="" ma:contentTypeName="Dokument" ma:contentTypeID="0x01010091FD76AC810CD946AFF2048135E5AED8" ma:contentTypeVersion="4" ma:contentTypeDescription="Ein neues Dokument erstellen." ma:contentTypeScope="" ma:versionID="f1a1cd72032fc8609ea7c3f0b5cd8b51">
   <xsd:schema xmlns:xsd="http://www.w3.org/2001/XMLSchema" xmlns:xs="http://www.w3.org/2001/XMLSchema" xmlns:p="http://schemas.microsoft.com/office/2006/metadata/properties" xmlns:ns2="e330c3bd-b73b-44bd-ae32-0c4bdfdcab8e" targetNamespace="http://schemas.microsoft.com/office/2006/metadata/properties" ma:root="true" ma:fieldsID="a8427e112a34e63d5c426854409c5fee" ns2:_="">
     <xsd:import namespace="e330c3bd-b73b-44bd-ae32-0c4bdfdcab8e"/>
@@ -13667,35 +13729,10 @@
 </ct:contentTypeSchema>
 </file>
 
-<file path=customXml/item2.xml><?xml version="1.0" encoding="utf-8"?>
-<p:properties xmlns:p="http://schemas.microsoft.com/office/2006/metadata/properties" xmlns:xsi="http://www.w3.org/2001/XMLSchema-instance" xmlns:pc="http://schemas.microsoft.com/office/infopath/2007/PartnerControls">
-  <documentManagement/>
-</p:properties>
-</file>
-
-<file path=customXml/item3.xml><?xml version="1.0" encoding="utf-8"?>
-<?mso-contentType ?>
-<FormTemplates xmlns="http://schemas.microsoft.com/sharepoint/v3/contenttype/forms">
-  <Display>DocumentLibraryForm</Display>
-  <Edit>DocumentLibraryForm</Edit>
-  <New>DocumentLibraryForm</New>
-</FormTemplates>
-</file>
-
 <file path=customXml/itemProps1.xml><?xml version="1.0" encoding="utf-8"?>
-<ds:datastoreItem xmlns:ds="http://schemas.openxmlformats.org/officeDocument/2006/customXml" ds:itemID="{B3B628B2-85F5-4AD2-9E28-9130197E5E7C}">
+<ds:datastoreItem xmlns:ds="http://schemas.openxmlformats.org/officeDocument/2006/customXml" ds:itemID="{1981A0EB-802E-4D0E-9A2A-3AE4F15204D8}">
   <ds:schemaRefs>
-    <ds:schemaRef ds:uri="e330c3bd-b73b-44bd-ae32-0c4bdfdcab8e"/>
-    <ds:schemaRef ds:uri="http://purl.org/dc/elements/1.1/"/>
-    <ds:schemaRef ds:uri="http://purl.org/dc/terms/"/>
-    <ds:schemaRef ds:uri="http://schemas.microsoft.com/internal/obd"/>
-    <ds:schemaRef ds:uri="http://schemas.microsoft.com/office/2006/documentManagement/types"/>
-    <ds:schemaRef ds:uri="http://schemas.microsoft.com/office/2006/metadata/contentType"/>
-    <ds:schemaRef ds:uri="http://schemas.microsoft.com/office/2006/metadata/properties"/>
-    <ds:schemaRef ds:uri="http://schemas.microsoft.com/office/2006/metadata/properties/metaAttributes"/>
-    <ds:schemaRef ds:uri="http://schemas.microsoft.com/office/infopath/2007/PartnerControls"/>
-    <ds:schemaRef ds:uri="http://schemas.openxmlformats.org/package/2006/metadata/core-properties"/>
-    <ds:schemaRef ds:uri="http://www.w3.org/2001/XMLSchema"/>
+    <ds:schemaRef ds:uri="http://schemas.microsoft.com/sharepoint/v3/contenttype/forms"/>
   </ds:schemaRefs>
 </ds:datastoreItem>
 </file>
@@ -13717,9 +13754,19 @@
 </file>
 
 <file path=customXml/itemProps3.xml><?xml version="1.0" encoding="utf-8"?>
-<ds:datastoreItem xmlns:ds="http://schemas.openxmlformats.org/officeDocument/2006/customXml" ds:itemID="{1981A0EB-802E-4D0E-9A2A-3AE4F15204D8}">
+<ds:datastoreItem xmlns:ds="http://schemas.openxmlformats.org/officeDocument/2006/customXml" ds:itemID="{B3B628B2-85F5-4AD2-9E28-9130197E5E7C}">
   <ds:schemaRefs>
-    <ds:schemaRef ds:uri="http://schemas.microsoft.com/sharepoint/v3/contenttype/forms"/>
+    <ds:schemaRef ds:uri="e330c3bd-b73b-44bd-ae32-0c4bdfdcab8e"/>
+    <ds:schemaRef ds:uri="http://purl.org/dc/elements/1.1/"/>
+    <ds:schemaRef ds:uri="http://purl.org/dc/terms/"/>
+    <ds:schemaRef ds:uri="http://schemas.microsoft.com/internal/obd"/>
+    <ds:schemaRef ds:uri="http://schemas.microsoft.com/office/2006/documentManagement/types"/>
+    <ds:schemaRef ds:uri="http://schemas.microsoft.com/office/2006/metadata/contentType"/>
+    <ds:schemaRef ds:uri="http://schemas.microsoft.com/office/2006/metadata/properties"/>
+    <ds:schemaRef ds:uri="http://schemas.microsoft.com/office/2006/metadata/properties/metaAttributes"/>
+    <ds:schemaRef ds:uri="http://schemas.microsoft.com/office/infopath/2007/PartnerControls"/>
+    <ds:schemaRef ds:uri="http://schemas.openxmlformats.org/package/2006/metadata/core-properties"/>
+    <ds:schemaRef ds:uri="http://www.w3.org/2001/XMLSchema"/>
   </ds:schemaRefs>
 </ds:datastoreItem>
 </file>
</xml_diff>

<commit_message>
Update Sprint Review and Add Comment!
</commit_message>
<xml_diff>
--- a/02_Backend/!_Docs/INF4_SYP_Gruppe1_Sprint3_Review.pptx
+++ b/02_Backend/!_Docs/INF4_SYP_Gruppe1_Sprint3_Review.pptx
@@ -140,6 +140,12 @@
     </p:ext>
   </p:extLst>
 </p:presentation>
+</file>
+
+<file path=ppt/authors.xml><?xml version="1.0" encoding="utf-8"?>
+<p188:authorLst xmlns:a="http://schemas.openxmlformats.org/drawingml/2006/main" xmlns:r="http://schemas.openxmlformats.org/officeDocument/2006/relationships" xmlns:p188="http://schemas.microsoft.com/office/powerpoint/2018/8/main">
+  <p188:author id="{3FB8EEC4-2817-02E0-61C1-69E6795FE54E}" name="Aberger Jonas" initials="JA" userId="S::jonas.aberger@htl-saalfelden.at::ceb1aaf8-5544-4c36-af61-de230cd7d456" providerId="AD"/>
+</p188:authorLst>
 </file>
 
 <file path=ppt/revisionInfo.xml><?xml version="1.0" encoding="utf-8"?>
@@ -728,7 +734,7 @@
 <file path=ppt/charts/chart1.xml><?xml version="1.0" encoding="utf-8"?>
 <c:chartSpace xmlns:c="http://schemas.openxmlformats.org/drawingml/2006/chart" xmlns:a="http://schemas.openxmlformats.org/drawingml/2006/main" xmlns:r="http://schemas.openxmlformats.org/officeDocument/2006/relationships" xmlns:c16r2="http://schemas.microsoft.com/office/drawing/2015/06/chart">
   <c:date1904 val="0"/>
-  <c:lang val="de-DE"/>
+  <c:lang val="en-US"/>
   <c:roundedCorners val="0"/>
   <mc:AlternateContent xmlns:mc="http://schemas.openxmlformats.org/markup-compatibility/2006">
     <mc:Choice xmlns:c14="http://schemas.microsoft.com/office/drawing/2007/8/2/chart" Requires="c14">
@@ -1165,7 +1171,7 @@
 <file path=ppt/charts/chart2.xml><?xml version="1.0" encoding="utf-8"?>
 <c:chartSpace xmlns:c="http://schemas.openxmlformats.org/drawingml/2006/chart" xmlns:a="http://schemas.openxmlformats.org/drawingml/2006/main" xmlns:r="http://schemas.openxmlformats.org/officeDocument/2006/relationships" xmlns:c16r2="http://schemas.microsoft.com/office/drawing/2015/06/chart">
   <c:date1904 val="0"/>
-  <c:lang val="de-DE"/>
+  <c:lang val="en-US"/>
   <c:roundedCorners val="0"/>
   <mc:AlternateContent xmlns:mc="http://schemas.openxmlformats.org/markup-compatibility/2006">
     <mc:Choice xmlns:c14="http://schemas.microsoft.com/office/drawing/2007/8/2/chart" Requires="c14">
@@ -1539,7 +1545,7 @@
 <file path=ppt/charts/chart3.xml><?xml version="1.0" encoding="utf-8"?>
 <c:chartSpace xmlns:c="http://schemas.openxmlformats.org/drawingml/2006/chart" xmlns:a="http://schemas.openxmlformats.org/drawingml/2006/main" xmlns:r="http://schemas.openxmlformats.org/officeDocument/2006/relationships" xmlns:c16r2="http://schemas.microsoft.com/office/drawing/2015/06/chart">
   <c:date1904 val="0"/>
-  <c:lang val="de-DE"/>
+  <c:lang val="en-US"/>
   <c:roundedCorners val="0"/>
   <mc:AlternateContent xmlns:mc="http://schemas.openxmlformats.org/markup-compatibility/2006">
     <mc:Choice xmlns:c14="http://schemas.microsoft.com/office/drawing/2007/8/2/chart" Requires="c14">
@@ -3487,6 +3493,32 @@
 </cs:chartStyle>
 </file>
 
+<file path=ppt/comments/modernComment_251_5ADF084.xml><?xml version="1.0" encoding="utf-8"?>
+<p188:cmLst xmlns:a="http://schemas.openxmlformats.org/drawingml/2006/main" xmlns:r="http://schemas.openxmlformats.org/officeDocument/2006/relationships" xmlns:p188="http://schemas.microsoft.com/office/powerpoint/2018/8/main">
+  <p188:cm id="{E8BF2D5A-9A72-4FA9-8156-F91480D6379C}" authorId="{3FB8EEC4-2817-02E0-61C1-69E6795FE54E}" created="2025-04-22T18:48:32.299">
+    <ac:txMkLst xmlns:ac="http://schemas.microsoft.com/office/drawing/2013/main/command">
+      <pc:docMk xmlns:pc="http://schemas.microsoft.com/office/powerpoint/2013/main/command"/>
+      <pc:sldMk xmlns:pc="http://schemas.microsoft.com/office/powerpoint/2013/main/command" cId="95285380" sldId="593"/>
+      <ac:spMk id="3" creationId="{CC72A9FA-848B-2740-6D96-BA53A545324E}"/>
+      <ac:txMk cp="271" len="25">
+        <ac:context len="325" hash="1360552643"/>
+      </ac:txMk>
+    </ac:txMkLst>
+    <p188:pos x="2697557" y="3819144"/>
+    <p188:txBody>
+      <a:bodyPr/>
+      <a:lstStyle/>
+      <a:p>
+        <a:r>
+          <a:rPr lang="de-AT"/>
+          <a:t>Aigner oder Eigner?</a:t>
+        </a:r>
+      </a:p>
+    </p188:txBody>
+  </p188:cm>
+</p188:cmLst>
+</file>
+
 <file path=ppt/handoutMasters/handoutMaster1.xml><?xml version="1.0" encoding="utf-8"?>
 <p:handoutMaster xmlns:a="http://schemas.openxmlformats.org/drawingml/2006/main" xmlns:r="http://schemas.openxmlformats.org/officeDocument/2006/relationships" xmlns:p="http://schemas.openxmlformats.org/presentationml/2006/main">
   <p:cSld>
@@ -3585,7 +3617,7 @@
             </a:pPr>
             <a:fld id="{3953DA5E-C6E2-4FA2-8BC8-7FF9A5EB6734}" type="datetimeFigureOut">
               <a:rPr lang="de-DE"/>
-              <a:t>09.04.2025</a:t>
+              <a:t>22.04.2025</a:t>
             </a:fld>
             <a:endParaRPr lang="de-DE"/>
           </a:p>
@@ -3667,7 +3699,7 @@
             </a:pPr>
             <a:fld id="{89A9BFB2-3314-459B-BBF3-97A86AECA4E3}" type="slidenum">
               <a:rPr lang="de-DE"/>
-              <a:t>‹Nr.›</a:t>
+              <a:t>‹#›</a:t>
             </a:fld>
             <a:endParaRPr lang="de-DE"/>
           </a:p>
@@ -3766,7 +3798,7 @@
           <a:p>
             <a:fld id="{88DE360A-102B-474E-BEC0-79AC7566E430}" type="datetimeFigureOut">
               <a:rPr lang="en-US" smtClean="0"/>
-              <a:t>4/9/2025</a:t>
+              <a:t>4/22/2025</a:t>
             </a:fld>
             <a:endParaRPr lang="en-US"/>
           </a:p>
@@ -3924,7 +3956,7 @@
           <a:p>
             <a:fld id="{18D8EB10-9094-CC46-9BCA-615730AD1A2C}" type="slidenum">
               <a:rPr lang="en-US" smtClean="0"/>
-              <a:t>‹Nr.›</a:t>
+              <a:t>‹#›</a:t>
             </a:fld>
             <a:endParaRPr lang="en-US"/>
           </a:p>
@@ -4404,7 +4436,7 @@
             </a:pPr>
             <a:fld id="{AE4538FE-AEB4-413B-B741-EC1BAEEF6B8F}" type="slidenum">
               <a:rPr lang="de-AT" smtClean="0"/>
-              <a:t>‹Nr.›</a:t>
+              <a:t>‹#›</a:t>
             </a:fld>
             <a:endParaRPr lang="de-AT"/>
           </a:p>
@@ -4585,7 +4617,7 @@
             </a:pPr>
             <a:fld id="{AE4538FE-AEB4-413B-B741-EC1BAEEF6B8F}" type="slidenum">
               <a:rPr lang="de-AT" smtClean="0"/>
-              <a:t>‹Nr.›</a:t>
+              <a:t>‹#›</a:t>
             </a:fld>
             <a:endParaRPr lang="de-AT"/>
           </a:p>
@@ -4771,7 +4803,7 @@
             </a:pPr>
             <a:fld id="{AE4538FE-AEB4-413B-B741-EC1BAEEF6B8F}" type="slidenum">
               <a:rPr lang="de-AT" smtClean="0"/>
-              <a:t>‹Nr.›</a:t>
+              <a:t>‹#›</a:t>
             </a:fld>
             <a:endParaRPr lang="de-AT"/>
           </a:p>
@@ -5049,7 +5081,7 @@
             </a:pPr>
             <a:fld id="{ABE8938C-29B8-4D68-B3E2-65383D25561A}" type="slidenum">
               <a:rPr lang="de-AT"/>
-              <a:t>‹Nr.›</a:t>
+              <a:t>‹#›</a:t>
             </a:fld>
             <a:endParaRPr lang="de-AT"/>
           </a:p>
@@ -5457,7 +5489,7 @@
             </a:pPr>
             <a:fld id="{ECAA92CB-F91D-4CDD-843E-C20D96A57C63}" type="slidenum">
               <a:rPr lang="de-AT"/>
-              <a:t>‹Nr.›</a:t>
+              <a:t>‹#›</a:t>
             </a:fld>
             <a:endParaRPr lang="de-AT"/>
           </a:p>
@@ -5567,7 +5599,7 @@
             </a:pPr>
             <a:fld id="{F9D08048-23C5-41A6-899C-F663368C05D2}" type="slidenum">
               <a:rPr lang="de-AT"/>
-              <a:t>‹Nr.›</a:t>
+              <a:t>‹#›</a:t>
             </a:fld>
             <a:endParaRPr lang="de-AT"/>
           </a:p>
@@ -5677,7 +5709,7 @@
             </a:pPr>
             <a:fld id="{646F7C12-618F-49D7-BEDD-2077C6E49D94}" type="slidenum">
               <a:rPr lang="de-AT"/>
-              <a:t>‹Nr.›</a:t>
+              <a:t>‹#›</a:t>
             </a:fld>
             <a:endParaRPr lang="de-AT"/>
           </a:p>
@@ -5880,7 +5912,7 @@
             </a:pPr>
             <a:fld id="{AE4538FE-AEB4-413B-B741-EC1BAEEF6B8F}" type="slidenum">
               <a:rPr lang="de-AT" smtClean="0"/>
-              <a:t>‹Nr.›</a:t>
+              <a:t>‹#›</a:t>
             </a:fld>
             <a:endParaRPr lang="de-AT"/>
           </a:p>
@@ -6132,7 +6164,7 @@
             </a:pPr>
             <a:fld id="{AE4538FE-AEB4-413B-B741-EC1BAEEF6B8F}" type="slidenum">
               <a:rPr lang="de-AT" smtClean="0"/>
-              <a:t>‹Nr.›</a:t>
+              <a:t>‹#›</a:t>
             </a:fld>
             <a:endParaRPr lang="de-AT"/>
           </a:p>
@@ -6375,7 +6407,7 @@
             </a:pPr>
             <a:fld id="{AE4538FE-AEB4-413B-B741-EC1BAEEF6B8F}" type="slidenum">
               <a:rPr lang="de-AT" smtClean="0"/>
-              <a:t>‹Nr.›</a:t>
+              <a:t>‹#›</a:t>
             </a:fld>
             <a:endParaRPr lang="de-AT"/>
           </a:p>
@@ -6748,7 +6780,7 @@
             </a:pPr>
             <a:fld id="{AE4538FE-AEB4-413B-B741-EC1BAEEF6B8F}" type="slidenum">
               <a:rPr lang="de-AT" smtClean="0"/>
-              <a:t>‹Nr.›</a:t>
+              <a:t>‹#›</a:t>
             </a:fld>
             <a:endParaRPr lang="de-AT"/>
           </a:p>
@@ -6877,7 +6909,7 @@
             </a:pPr>
             <a:fld id="{AE4538FE-AEB4-413B-B741-EC1BAEEF6B8F}" type="slidenum">
               <a:rPr lang="de-AT" smtClean="0"/>
-              <a:t>‹Nr.›</a:t>
+              <a:t>‹#›</a:t>
             </a:fld>
             <a:endParaRPr lang="de-AT"/>
           </a:p>
@@ -6975,7 +7007,7 @@
             </a:pPr>
             <a:fld id="{AE4538FE-AEB4-413B-B741-EC1BAEEF6B8F}" type="slidenum">
               <a:rPr lang="de-AT" smtClean="0"/>
-              <a:t>‹Nr.›</a:t>
+              <a:t>‹#›</a:t>
             </a:fld>
             <a:endParaRPr lang="de-AT"/>
           </a:p>
@@ -7258,7 +7290,7 @@
             </a:pPr>
             <a:fld id="{AE4538FE-AEB4-413B-B741-EC1BAEEF6B8F}" type="slidenum">
               <a:rPr lang="de-AT" smtClean="0"/>
-              <a:t>‹Nr.›</a:t>
+              <a:t>‹#›</a:t>
             </a:fld>
             <a:endParaRPr lang="de-AT"/>
           </a:p>
@@ -7517,7 +7549,7 @@
             </a:pPr>
             <a:fld id="{AE4538FE-AEB4-413B-B741-EC1BAEEF6B8F}" type="slidenum">
               <a:rPr lang="de-AT" smtClean="0"/>
-              <a:t>‹Nr.›</a:t>
+              <a:t>‹#›</a:t>
             </a:fld>
             <a:endParaRPr lang="de-AT"/>
           </a:p>
@@ -7739,7 +7771,7 @@
             </a:pPr>
             <a:fld id="{AE4538FE-AEB4-413B-B741-EC1BAEEF6B8F}" type="slidenum">
               <a:rPr lang="de-AT" smtClean="0"/>
-              <a:t>‹Nr.›</a:t>
+              <a:t>‹#›</a:t>
             </a:fld>
             <a:endParaRPr lang="de-AT"/>
           </a:p>
@@ -11661,7 +11693,7 @@
         <p:spPr>
           <a:xfrm>
             <a:off x="350674" y="1530036"/>
-            <a:ext cx="8171154" cy="5016758"/>
+            <a:ext cx="8171154" cy="4801314"/>
           </a:xfrm>
           <a:prstGeom prst="rect">
             <a:avLst/>
@@ -11726,31 +11758,42 @@
               </a:rPr>
               <a:t>Sprint-Review III</a:t>
             </a:r>
+            <a:endParaRPr lang="de-DE" sz="1000" dirty="0">
+              <a:latin typeface="Calibri" panose="020F0502020204030204" charset="0"/>
+            </a:endParaRPr>
+          </a:p>
+          <a:p>
+            <a:endParaRPr lang="de-DE" sz="2000" dirty="0">
+              <a:latin typeface="Calibri" panose="020F0502020204030204" charset="0"/>
+            </a:endParaRPr>
+          </a:p>
+          <a:p>
+            <a:endParaRPr lang="de-DE" sz="1400" dirty="0">
+              <a:latin typeface="Calibri" panose="020F0502020204030204" charset="0"/>
+            </a:endParaRPr>
+          </a:p>
+          <a:p>
+            <a:r>
+              <a:rPr lang="de-DE" b="1" dirty="0">
+                <a:latin typeface="Calibri" panose="020F0502020204030204" charset="0"/>
+              </a:rPr>
+              <a:t>Fabian Haslinger</a:t>
+            </a:r>
+            <a:endParaRPr lang="de-DE" sz="1400" dirty="0">
+              <a:latin typeface="Calibri" panose="020F0502020204030204" charset="0"/>
+            </a:endParaRPr>
           </a:p>
           <a:p>
             <a:pPr marL="342900" indent="-342900" algn="just">
               <a:buFont typeface="Symbol" panose="05050102010706020507" pitchFamily="18" charset="2"/>
               <a:buChar char="-"/>
             </a:pPr>
-            <a:endParaRPr lang="de-DE" sz="2000" dirty="0">
-              <a:latin typeface="Calibri" panose="020F0502020204030204" charset="0"/>
-            </a:endParaRPr>
-          </a:p>
-          <a:p>
-            <a:endParaRPr lang="de-DE" sz="1400" dirty="0">
-              <a:latin typeface="Calibri" panose="020F0502020204030204" charset="0"/>
-            </a:endParaRPr>
-          </a:p>
-          <a:p>
-            <a:r>
-              <a:rPr lang="de-DE" b="1" dirty="0">
+            <a:r>
+              <a:rPr lang="de-DE" sz="2000" dirty="0">
                 <a:latin typeface="Calibri" panose="020F0502020204030204" charset="0"/>
               </a:rPr>
-              <a:t>Fabian Haslinger</a:t>
-            </a:r>
-            <a:endParaRPr lang="de-DE" sz="1400" dirty="0">
-              <a:latin typeface="Calibri" panose="020F0502020204030204" charset="0"/>
-            </a:endParaRPr>
+              <a:t>Discovery-Mode Spike Story</a:t>
+            </a:r>
           </a:p>
           <a:p>
             <a:pPr marL="342900" indent="-342900" algn="just">
@@ -11761,32 +11804,10 @@
               <a:rPr lang="de-DE" sz="2000" dirty="0">
                 <a:latin typeface="Calibri" panose="020F0502020204030204" charset="0"/>
               </a:rPr>
-              <a:t>Discovery-Mode Spike Story</a:t>
-            </a:r>
-          </a:p>
-          <a:p>
-            <a:pPr marL="342900" indent="-342900" algn="just">
-              <a:buFont typeface="Symbol" panose="05050102010706020507" pitchFamily="18" charset="2"/>
-              <a:buChar char="-"/>
-            </a:pPr>
-            <a:r>
-              <a:rPr lang="de-DE" sz="2000" dirty="0">
-                <a:latin typeface="Calibri" panose="020F0502020204030204" charset="0"/>
-              </a:rPr>
               <a:t>Discovery-Mode</a:t>
             </a:r>
           </a:p>
           <a:p>
-            <a:pPr marL="342900" indent="-342900" algn="just">
-              <a:buFont typeface="Symbol" panose="05050102010706020507" pitchFamily="18" charset="2"/>
-              <a:buChar char="-"/>
-            </a:pPr>
-            <a:endParaRPr lang="de-DE" sz="2000" dirty="0">
-              <a:latin typeface="Calibri" panose="020F0502020204030204" charset="0"/>
-            </a:endParaRPr>
-          </a:p>
-          <a:p>
-            <a:pPr algn="just"/>
             <a:endParaRPr lang="de-DE" sz="2000" dirty="0">
               <a:latin typeface="Calibri" panose="020F0502020204030204" charset="0"/>
             </a:endParaRPr>
@@ -12275,7 +12296,7 @@
                                         <p:tgtEl>
                                           <p:spTgt spid="5">
                                             <p:txEl>
-                                              <p:pRg st="14" end="14"/>
+                                              <p:pRg st="13" end="13"/>
                                             </p:txEl>
                                           </p:spTgt>
                                         </p:tgtEl>
@@ -12293,7 +12314,7 @@
                                         <p:tgtEl>
                                           <p:spTgt spid="5">
                                             <p:txEl>
-                                              <p:pRg st="14" end="14"/>
+                                              <p:pRg st="13" end="13"/>
                                             </p:txEl>
                                           </p:spTgt>
                                         </p:tgtEl>
@@ -12311,7 +12332,7 @@
                                         <p:tgtEl>
                                           <p:spTgt spid="5">
                                             <p:txEl>
-                                              <p:pRg st="14" end="14"/>
+                                              <p:pRg st="13" end="13"/>
                                             </p:txEl>
                                           </p:spTgt>
                                         </p:tgtEl>
@@ -12329,7 +12350,7 @@
                                         <p:tgtEl>
                                           <p:spTgt spid="5">
                                             <p:txEl>
-                                              <p:pRg st="14" end="14"/>
+                                              <p:pRg st="13" end="13"/>
                                             </p:txEl>
                                           </p:spTgt>
                                         </p:tgtEl>
@@ -12437,7 +12458,7 @@
                                         <p:tgtEl>
                                           <p:spTgt spid="5">
                                             <p:txEl>
-                                              <p:pRg st="15" end="15"/>
+                                              <p:pRg st="14" end="14"/>
                                             </p:txEl>
                                           </p:spTgt>
                                         </p:tgtEl>
@@ -12455,7 +12476,7 @@
                                         <p:tgtEl>
                                           <p:spTgt spid="5">
                                             <p:txEl>
-                                              <p:pRg st="15" end="15"/>
+                                              <p:pRg st="14" end="14"/>
                                             </p:txEl>
                                           </p:spTgt>
                                         </p:tgtEl>
@@ -12473,7 +12494,7 @@
                                         <p:tgtEl>
                                           <p:spTgt spid="5">
                                             <p:txEl>
-                                              <p:pRg st="15" end="15"/>
+                                              <p:pRg st="14" end="14"/>
                                             </p:txEl>
                                           </p:spTgt>
                                         </p:tgtEl>
@@ -12491,7 +12512,7 @@
                                         <p:tgtEl>
                                           <p:spTgt spid="5">
                                             <p:txEl>
-                                              <p:pRg st="15" end="15"/>
+                                              <p:pRg st="14" end="14"/>
                                             </p:txEl>
                                           </p:spTgt>
                                         </p:tgtEl>
@@ -12786,6 +12807,11 @@
   <p:clrMapOvr>
     <a:masterClrMapping/>
   </p:clrMapOvr>
+  <p:extLst>
+    <p:ext uri="{6950BFC3-D8DA-4A85-94F7-54DA5524770B}">
+      <p188:commentRel xmlns:p188="http://schemas.microsoft.com/office/powerpoint/2018/8/main" r:id="rId2"/>
+    </p:ext>
+  </p:extLst>
 </p:sld>
 </file>
 
@@ -13600,6 +13626,21 @@
 </file>
 
 <file path=customXml/item1.xml><?xml version="1.0" encoding="utf-8"?>
+<?mso-contentType ?>
+<FormTemplates xmlns="http://schemas.microsoft.com/sharepoint/v3/contenttype/forms">
+  <Display>DocumentLibraryForm</Display>
+  <Edit>DocumentLibraryForm</Edit>
+  <New>DocumentLibraryForm</New>
+</FormTemplates>
+</file>
+
+<file path=customXml/item2.xml><?xml version="1.0" encoding="utf-8"?>
+<p:properties xmlns:p="http://schemas.microsoft.com/office/2006/metadata/properties" xmlns:xsi="http://www.w3.org/2001/XMLSchema-instance" xmlns:pc="http://schemas.microsoft.com/office/infopath/2007/PartnerControls">
+  <documentManagement/>
+</p:properties>
+</file>
+
+<file path=customXml/item3.xml><?xml version="1.0" encoding="utf-8"?>
 <ct:contentTypeSchema xmlns:ct="http://schemas.microsoft.com/office/2006/metadata/contentType" xmlns:ma="http://schemas.microsoft.com/office/2006/metadata/properties/metaAttributes" ct:_="" ma:_="" ma:contentTypeName="Dokument" ma:contentTypeID="0x01010091FD76AC810CD946AFF2048135E5AED8" ma:contentTypeVersion="4" ma:contentTypeDescription="Ein neues Dokument erstellen." ma:contentTypeScope="" ma:versionID="f1a1cd72032fc8609ea7c3f0b5cd8b51">
   <xsd:schema xmlns:xsd="http://www.w3.org/2001/XMLSchema" xmlns:xs="http://www.w3.org/2001/XMLSchema" xmlns:p="http://schemas.microsoft.com/office/2006/metadata/properties" xmlns:ns2="e330c3bd-b73b-44bd-ae32-0c4bdfdcab8e" targetNamespace="http://schemas.microsoft.com/office/2006/metadata/properties" ma:root="true" ma:fieldsID="a8427e112a34e63d5c426854409c5fee" ns2:_="">
     <xsd:import namespace="e330c3bd-b73b-44bd-ae32-0c4bdfdcab8e"/>
@@ -13743,35 +13784,10 @@
 </ct:contentTypeSchema>
 </file>
 
-<file path=customXml/item2.xml><?xml version="1.0" encoding="utf-8"?>
-<p:properties xmlns:p="http://schemas.microsoft.com/office/2006/metadata/properties" xmlns:xsi="http://www.w3.org/2001/XMLSchema-instance" xmlns:pc="http://schemas.microsoft.com/office/infopath/2007/PartnerControls">
-  <documentManagement/>
-</p:properties>
-</file>
-
-<file path=customXml/item3.xml><?xml version="1.0" encoding="utf-8"?>
-<?mso-contentType ?>
-<FormTemplates xmlns="http://schemas.microsoft.com/sharepoint/v3/contenttype/forms">
-  <Display>DocumentLibraryForm</Display>
-  <Edit>DocumentLibraryForm</Edit>
-  <New>DocumentLibraryForm</New>
-</FormTemplates>
-</file>
-
 <file path=customXml/itemProps1.xml><?xml version="1.0" encoding="utf-8"?>
-<ds:datastoreItem xmlns:ds="http://schemas.openxmlformats.org/officeDocument/2006/customXml" ds:itemID="{B3B628B2-85F5-4AD2-9E28-9130197E5E7C}">
+<ds:datastoreItem xmlns:ds="http://schemas.openxmlformats.org/officeDocument/2006/customXml" ds:itemID="{1981A0EB-802E-4D0E-9A2A-3AE4F15204D8}">
   <ds:schemaRefs>
-    <ds:schemaRef ds:uri="e330c3bd-b73b-44bd-ae32-0c4bdfdcab8e"/>
-    <ds:schemaRef ds:uri="http://purl.org/dc/elements/1.1/"/>
-    <ds:schemaRef ds:uri="http://purl.org/dc/terms/"/>
-    <ds:schemaRef ds:uri="http://schemas.microsoft.com/internal/obd"/>
-    <ds:schemaRef ds:uri="http://schemas.microsoft.com/office/2006/documentManagement/types"/>
-    <ds:schemaRef ds:uri="http://schemas.microsoft.com/office/2006/metadata/contentType"/>
-    <ds:schemaRef ds:uri="http://schemas.microsoft.com/office/2006/metadata/properties"/>
-    <ds:schemaRef ds:uri="http://schemas.microsoft.com/office/2006/metadata/properties/metaAttributes"/>
-    <ds:schemaRef ds:uri="http://schemas.microsoft.com/office/infopath/2007/PartnerControls"/>
-    <ds:schemaRef ds:uri="http://schemas.openxmlformats.org/package/2006/metadata/core-properties"/>
-    <ds:schemaRef ds:uri="http://www.w3.org/2001/XMLSchema"/>
+    <ds:schemaRef ds:uri="http://schemas.microsoft.com/sharepoint/v3/contenttype/forms"/>
   </ds:schemaRefs>
 </ds:datastoreItem>
 </file>
@@ -13793,9 +13809,19 @@
 </file>
 
 <file path=customXml/itemProps3.xml><?xml version="1.0" encoding="utf-8"?>
-<ds:datastoreItem xmlns:ds="http://schemas.openxmlformats.org/officeDocument/2006/customXml" ds:itemID="{1981A0EB-802E-4D0E-9A2A-3AE4F15204D8}">
+<ds:datastoreItem xmlns:ds="http://schemas.openxmlformats.org/officeDocument/2006/customXml" ds:itemID="{B3B628B2-85F5-4AD2-9E28-9130197E5E7C}">
   <ds:schemaRefs>
-    <ds:schemaRef ds:uri="http://schemas.microsoft.com/sharepoint/v3/contenttype/forms"/>
+    <ds:schemaRef ds:uri="e330c3bd-b73b-44bd-ae32-0c4bdfdcab8e"/>
+    <ds:schemaRef ds:uri="http://purl.org/dc/elements/1.1/"/>
+    <ds:schemaRef ds:uri="http://purl.org/dc/terms/"/>
+    <ds:schemaRef ds:uri="http://schemas.microsoft.com/internal/obd"/>
+    <ds:schemaRef ds:uri="http://schemas.microsoft.com/office/2006/documentManagement/types"/>
+    <ds:schemaRef ds:uri="http://schemas.microsoft.com/office/2006/metadata/contentType"/>
+    <ds:schemaRef ds:uri="http://schemas.microsoft.com/office/2006/metadata/properties"/>
+    <ds:schemaRef ds:uri="http://schemas.microsoft.com/office/2006/metadata/properties/metaAttributes"/>
+    <ds:schemaRef ds:uri="http://schemas.microsoft.com/office/infopath/2007/PartnerControls"/>
+    <ds:schemaRef ds:uri="http://schemas.openxmlformats.org/package/2006/metadata/core-properties"/>
+    <ds:schemaRef ds:uri="http://www.w3.org/2001/XMLSchema"/>
   </ds:schemaRefs>
 </ds:datastoreItem>
 </file>
</xml_diff>

<commit_message>
Add Sprint 3 Review presentation for INF4 SYP Gruppe 1
</commit_message>
<xml_diff>
--- a/02_Backend/!_Docs/INF4_SYP_Gruppe1_Sprint3_Review.pptx
+++ b/02_Backend/!_Docs/INF4_SYP_Gruppe1_Sprint3_Review.pptx
@@ -10397,7 +10397,7 @@
         <p:spPr>
           <a:xfrm>
             <a:off x="611560" y="1736229"/>
-            <a:ext cx="8223250" cy="3908762"/>
+            <a:ext cx="8223250" cy="4154984"/>
           </a:xfrm>
           <a:prstGeom prst="rect">
             <a:avLst/>
@@ -10500,6 +10500,30 @@
                 <a:latin typeface="Calibri" panose="020F0502020204030204" charset="0"/>
               </a:rPr>
               <a:t>Überschreiben / Löschen einer bereits gespeicherten Route</a:t>
+            </a:r>
+          </a:p>
+          <a:p>
+            <a:pPr marL="285750" indent="-285750">
+              <a:buFont typeface="Symbol" panose="05050102010706020507" pitchFamily="18" charset="2"/>
+              <a:buChar char="-"/>
+            </a:pPr>
+            <a:r>
+              <a:rPr lang="de-DE" altLang="en-US" sz="1600" dirty="0">
+                <a:latin typeface="Calibri" panose="020F0502020204030204" charset="0"/>
+              </a:rPr>
+              <a:t>Swagger-Seite für </a:t>
+            </a:r>
+            <a:r>
+              <a:rPr lang="de-DE" altLang="en-US" sz="1600" dirty="0" err="1">
+                <a:latin typeface="Calibri" panose="020F0502020204030204" charset="0"/>
+              </a:rPr>
+              <a:t>Endpoint</a:t>
+            </a:r>
+            <a:r>
+              <a:rPr lang="de-DE" altLang="en-US" sz="1600" dirty="0">
+                <a:latin typeface="Calibri" panose="020F0502020204030204" charset="0"/>
+              </a:rPr>
+              <a:t>-Visualisierung</a:t>
             </a:r>
           </a:p>
           <a:p>
@@ -10725,7 +10749,7 @@
         <p:spPr>
           <a:xfrm>
             <a:off x="611560" y="1736229"/>
-            <a:ext cx="8223250" cy="3647152"/>
+            <a:ext cx="8223250" cy="4139595"/>
           </a:xfrm>
           <a:prstGeom prst="rect">
             <a:avLst/>
@@ -10844,6 +10868,51 @@
               </a:rPr>
               <a:t>Überschreiben / Löschen einer bereits gespeicherten Route</a:t>
             </a:r>
+          </a:p>
+          <a:p>
+            <a:pPr marL="285750" indent="-285750">
+              <a:buFont typeface="Wingdings" panose="05000000000000000000" pitchFamily="2" charset="2"/>
+              <a:buChar char="ü"/>
+            </a:pPr>
+            <a:r>
+              <a:rPr lang="de-DE" altLang="en-US" sz="1600" dirty="0">
+                <a:solidFill>
+                  <a:srgbClr val="00B050"/>
+                </a:solidFill>
+                <a:latin typeface="Calibri" panose="020F0502020204030204" charset="0"/>
+              </a:rPr>
+              <a:t>Swagger-Seite für </a:t>
+            </a:r>
+            <a:r>
+              <a:rPr lang="de-DE" altLang="en-US" sz="1600" dirty="0" err="1">
+                <a:solidFill>
+                  <a:srgbClr val="00B050"/>
+                </a:solidFill>
+                <a:latin typeface="Calibri" panose="020F0502020204030204" charset="0"/>
+              </a:rPr>
+              <a:t>Endpoint</a:t>
+            </a:r>
+            <a:r>
+              <a:rPr lang="de-DE" altLang="en-US" sz="1600" dirty="0">
+                <a:solidFill>
+                  <a:srgbClr val="00B050"/>
+                </a:solidFill>
+                <a:latin typeface="Calibri" panose="020F0502020204030204" charset="0"/>
+              </a:rPr>
+              <a:t>-Visualisierung</a:t>
+            </a:r>
+          </a:p>
+          <a:p>
+            <a:pPr marL="285750" indent="-285750">
+              <a:buFont typeface="Wingdings" panose="05000000000000000000" pitchFamily="2" charset="2"/>
+              <a:buChar char="ü"/>
+            </a:pPr>
+            <a:endParaRPr lang="de-DE" altLang="en-US" sz="1600" dirty="0">
+              <a:solidFill>
+                <a:srgbClr val="00B050"/>
+              </a:solidFill>
+              <a:latin typeface="Calibri" panose="020F0502020204030204" charset="0"/>
+            </a:endParaRPr>
           </a:p>
           <a:p>
             <a:pPr marL="285750" indent="-285750">
@@ -13600,6 +13669,21 @@
 </file>
 
 <file path=customXml/item1.xml><?xml version="1.0" encoding="utf-8"?>
+<p:properties xmlns:p="http://schemas.microsoft.com/office/2006/metadata/properties" xmlns:xsi="http://www.w3.org/2001/XMLSchema-instance" xmlns:pc="http://schemas.microsoft.com/office/infopath/2007/PartnerControls">
+  <documentManagement/>
+</p:properties>
+</file>
+
+<file path=customXml/item2.xml><?xml version="1.0" encoding="utf-8"?>
+<?mso-contentType ?>
+<FormTemplates xmlns="http://schemas.microsoft.com/sharepoint/v3/contenttype/forms">
+  <Display>DocumentLibraryForm</Display>
+  <Edit>DocumentLibraryForm</Edit>
+  <New>DocumentLibraryForm</New>
+</FormTemplates>
+</file>
+
+<file path=customXml/item3.xml><?xml version="1.0" encoding="utf-8"?>
 <ct:contentTypeSchema xmlns:ct="http://schemas.microsoft.com/office/2006/metadata/contentType" xmlns:ma="http://schemas.microsoft.com/office/2006/metadata/properties/metaAttributes" ct:_="" ma:_="" ma:contentTypeName="Dokument" ma:contentTypeID="0x01010091FD76AC810CD946AFF2048135E5AED8" ma:contentTypeVersion="4" ma:contentTypeDescription="Ein neues Dokument erstellen." ma:contentTypeScope="" ma:versionID="f1a1cd72032fc8609ea7c3f0b5cd8b51">
   <xsd:schema xmlns:xsd="http://www.w3.org/2001/XMLSchema" xmlns:xs="http://www.w3.org/2001/XMLSchema" xmlns:p="http://schemas.microsoft.com/office/2006/metadata/properties" xmlns:ns2="e330c3bd-b73b-44bd-ae32-0c4bdfdcab8e" targetNamespace="http://schemas.microsoft.com/office/2006/metadata/properties" ma:root="true" ma:fieldsID="a8427e112a34e63d5c426854409c5fee" ns2:_="">
     <xsd:import namespace="e330c3bd-b73b-44bd-ae32-0c4bdfdcab8e"/>
@@ -13743,22 +13827,31 @@
 </ct:contentTypeSchema>
 </file>
 
-<file path=customXml/item2.xml><?xml version="1.0" encoding="utf-8"?>
-<p:properties xmlns:p="http://schemas.microsoft.com/office/2006/metadata/properties" xmlns:xsi="http://www.w3.org/2001/XMLSchema-instance" xmlns:pc="http://schemas.microsoft.com/office/infopath/2007/PartnerControls">
-  <documentManagement/>
-</p:properties>
+<file path=customXml/itemProps1.xml><?xml version="1.0" encoding="utf-8"?>
+<ds:datastoreItem xmlns:ds="http://schemas.openxmlformats.org/officeDocument/2006/customXml" ds:itemID="{8354EFAF-31A0-41ED-A74D-DAE704B6C081}">
+  <ds:schemaRefs>
+    <ds:schemaRef ds:uri="http://schemas.openxmlformats.org/package/2006/metadata/core-properties"/>
+    <ds:schemaRef ds:uri="http://schemas.microsoft.com/office/2006/documentManagement/types"/>
+    <ds:schemaRef ds:uri="http://www.w3.org/XML/1998/namespace"/>
+    <ds:schemaRef ds:uri="http://schemas.microsoft.com/office/infopath/2007/PartnerControls"/>
+    <ds:schemaRef ds:uri="http://purl.org/dc/elements/1.1/"/>
+    <ds:schemaRef ds:uri="e330c3bd-b73b-44bd-ae32-0c4bdfdcab8e"/>
+    <ds:schemaRef ds:uri="http://schemas.microsoft.com/office/2006/metadata/properties"/>
+    <ds:schemaRef ds:uri="http://purl.org/dc/dcmitype/"/>
+    <ds:schemaRef ds:uri="http://purl.org/dc/terms/"/>
+  </ds:schemaRefs>
+</ds:datastoreItem>
 </file>
 
-<file path=customXml/item3.xml><?xml version="1.0" encoding="utf-8"?>
-<?mso-contentType ?>
-<FormTemplates xmlns="http://schemas.microsoft.com/sharepoint/v3/contenttype/forms">
-  <Display>DocumentLibraryForm</Display>
-  <Edit>DocumentLibraryForm</Edit>
-  <New>DocumentLibraryForm</New>
-</FormTemplates>
+<file path=customXml/itemProps2.xml><?xml version="1.0" encoding="utf-8"?>
+<ds:datastoreItem xmlns:ds="http://schemas.openxmlformats.org/officeDocument/2006/customXml" ds:itemID="{1981A0EB-802E-4D0E-9A2A-3AE4F15204D8}">
+  <ds:schemaRefs>
+    <ds:schemaRef ds:uri="http://schemas.microsoft.com/sharepoint/v3/contenttype/forms"/>
+  </ds:schemaRefs>
+</ds:datastoreItem>
 </file>
 
-<file path=customXml/itemProps1.xml><?xml version="1.0" encoding="utf-8"?>
+<file path=customXml/itemProps3.xml><?xml version="1.0" encoding="utf-8"?>
 <ds:datastoreItem xmlns:ds="http://schemas.openxmlformats.org/officeDocument/2006/customXml" ds:itemID="{B3B628B2-85F5-4AD2-9E28-9130197E5E7C}">
   <ds:schemaRefs>
     <ds:schemaRef ds:uri="e330c3bd-b73b-44bd-ae32-0c4bdfdcab8e"/>
@@ -13774,28 +13867,4 @@
     <ds:schemaRef ds:uri="http://www.w3.org/2001/XMLSchema"/>
   </ds:schemaRefs>
 </ds:datastoreItem>
-</file>
-
-<file path=customXml/itemProps2.xml><?xml version="1.0" encoding="utf-8"?>
-<ds:datastoreItem xmlns:ds="http://schemas.openxmlformats.org/officeDocument/2006/customXml" ds:itemID="{8354EFAF-31A0-41ED-A74D-DAE704B6C081}">
-  <ds:schemaRefs>
-    <ds:schemaRef ds:uri="http://schemas.openxmlformats.org/package/2006/metadata/core-properties"/>
-    <ds:schemaRef ds:uri="http://schemas.microsoft.com/office/2006/documentManagement/types"/>
-    <ds:schemaRef ds:uri="http://www.w3.org/XML/1998/namespace"/>
-    <ds:schemaRef ds:uri="http://schemas.microsoft.com/office/infopath/2007/PartnerControls"/>
-    <ds:schemaRef ds:uri="http://purl.org/dc/elements/1.1/"/>
-    <ds:schemaRef ds:uri="e330c3bd-b73b-44bd-ae32-0c4bdfdcab8e"/>
-    <ds:schemaRef ds:uri="http://schemas.microsoft.com/office/2006/metadata/properties"/>
-    <ds:schemaRef ds:uri="http://purl.org/dc/dcmitype/"/>
-    <ds:schemaRef ds:uri="http://purl.org/dc/terms/"/>
-  </ds:schemaRefs>
-</ds:datastoreItem>
-</file>
-
-<file path=customXml/itemProps3.xml><?xml version="1.0" encoding="utf-8"?>
-<ds:datastoreItem xmlns:ds="http://schemas.openxmlformats.org/officeDocument/2006/customXml" ds:itemID="{1981A0EB-802E-4D0E-9A2A-3AE4F15204D8}">
-  <ds:schemaRefs>
-    <ds:schemaRef ds:uri="http://schemas.microsoft.com/sharepoint/v3/contenttype/forms"/>
-  </ds:schemaRefs>
-</ds:datastoreItem>
 </file>
</xml_diff>

<commit_message>
Correctly implement the swagger icon
</commit_message>
<xml_diff>
--- a/02_Backend/!_Docs/INF4_SYP_Gruppe1_Sprint3_Review.pptx
+++ b/02_Backend/!_Docs/INF4_SYP_Gruppe1_Sprint3_Review.pptx
@@ -10396,8 +10396,8 @@
         </p:nvSpPr>
         <p:spPr>
           <a:xfrm>
-            <a:off x="611560" y="1736229"/>
-            <a:ext cx="8223250" cy="4647426"/>
+            <a:off x="628650" y="1643163"/>
+            <a:ext cx="8223250" cy="5078313"/>
           </a:xfrm>
           <a:prstGeom prst="rect">
             <a:avLst/>
@@ -10436,7 +10436,7 @@
               <a:buNone/>
             </a:pPr>
             <a:r>
-              <a:rPr lang="de-DE" altLang="en-US" sz="1600" b="1" dirty="0">
+              <a:rPr lang="de-DE" altLang="en-US" b="1" dirty="0">
                 <a:latin typeface="Calibri" panose="020F0502020204030204" charset="0"/>
               </a:rPr>
               <a:t>Fahrstreckenlogik</a:t>
@@ -10448,7 +10448,7 @@
               <a:buChar char="-"/>
             </a:pPr>
             <a:r>
-              <a:rPr lang="de-DE" altLang="en-US" sz="1600" dirty="0">
+              <a:rPr lang="de-DE" altLang="en-US" dirty="0">
                 <a:latin typeface="Calibri" panose="020F0502020204030204" charset="0"/>
               </a:rPr>
               <a:t>Bestehende Verbindung zur DB</a:t>
@@ -10460,7 +10460,7 @@
               <a:buChar char="-"/>
             </a:pPr>
             <a:r>
-              <a:rPr lang="de-DE" altLang="en-US" sz="1600" dirty="0">
+              <a:rPr lang="de-DE" altLang="en-US" dirty="0">
                 <a:latin typeface="Calibri" panose="020F0502020204030204" charset="0"/>
               </a:rPr>
               <a:t>Speicherung der abgefahrenen Strecken</a:t>
@@ -10472,7 +10472,7 @@
               <a:buChar char="-"/>
             </a:pPr>
             <a:r>
-              <a:rPr lang="de-DE" altLang="en-US" sz="1600" dirty="0">
+              <a:rPr lang="de-DE" altLang="en-US" dirty="0">
                 <a:latin typeface="Calibri" panose="020F0502020204030204" charset="0"/>
               </a:rPr>
               <a:t>Speicherung der manuell erstellten Routen</a:t>
@@ -10484,7 +10484,7 @@
               <a:buChar char="-"/>
             </a:pPr>
             <a:r>
-              <a:rPr lang="de-DE" altLang="en-US" sz="1600" dirty="0">
+              <a:rPr lang="de-DE" altLang="en-US" dirty="0">
                 <a:latin typeface="Calibri" panose="020F0502020204030204" charset="0"/>
               </a:rPr>
               <a:t>Abrufen / Abfahren der gespeicherten Routen</a:t>
@@ -10496,7 +10496,7 @@
               <a:buChar char="-"/>
             </a:pPr>
             <a:r>
-              <a:rPr lang="de-DE" altLang="en-US" sz="1600" dirty="0">
+              <a:rPr lang="de-DE" altLang="en-US" dirty="0">
                 <a:latin typeface="Calibri" panose="020F0502020204030204" charset="0"/>
               </a:rPr>
               <a:t>Überschreiben / Löschen einer bereits gespeicherten Route</a:t>
@@ -10508,19 +10508,19 @@
               <a:buChar char="-"/>
             </a:pPr>
             <a:r>
-              <a:rPr lang="de-DE" altLang="en-US" sz="1600" dirty="0">
+              <a:rPr lang="de-DE" altLang="en-US" dirty="0">
                 <a:latin typeface="Calibri" panose="020F0502020204030204" charset="0"/>
               </a:rPr>
               <a:t>Swagger-Seite für </a:t>
             </a:r>
             <a:r>
-              <a:rPr lang="de-DE" altLang="en-US" sz="1600" dirty="0" err="1">
+              <a:rPr lang="de-DE" altLang="en-US" dirty="0" err="1">
                 <a:latin typeface="Calibri" panose="020F0502020204030204" charset="0"/>
               </a:rPr>
               <a:t>Endpoint</a:t>
             </a:r>
             <a:r>
-              <a:rPr lang="de-DE" altLang="en-US" sz="1600" dirty="0">
+              <a:rPr lang="de-DE" altLang="en-US" dirty="0">
                 <a:latin typeface="Calibri" panose="020F0502020204030204" charset="0"/>
               </a:rPr>
               <a:t>-Visualisierung</a:t>
@@ -10531,18 +10531,18 @@
               <a:buFontTx/>
               <a:buChar char="-"/>
             </a:pPr>
-            <a:endParaRPr lang="de-DE" altLang="en-US" sz="1600" dirty="0">
+            <a:endParaRPr lang="de-DE" altLang="en-US" dirty="0">
               <a:latin typeface="Calibri" panose="020F0502020204030204" charset="0"/>
             </a:endParaRPr>
           </a:p>
           <a:p>
-            <a:endParaRPr lang="de-DE" altLang="en-US" sz="1600" dirty="0">
+            <a:endParaRPr lang="de-DE" altLang="en-US" dirty="0">
               <a:latin typeface="Calibri" panose="020F0502020204030204" charset="0"/>
             </a:endParaRPr>
           </a:p>
           <a:p>
             <a:r>
-              <a:rPr lang="de-DE" altLang="en-US" sz="1600" b="1" dirty="0">
+              <a:rPr lang="de-DE" altLang="en-US" b="1" dirty="0">
                 <a:latin typeface="Calibri" panose="020F0502020204030204" charset="0"/>
               </a:rPr>
               <a:t>Discovery-Mode / Kartographie</a:t>
@@ -10554,7 +10554,7 @@
               <a:buChar char="-"/>
             </a:pPr>
             <a:r>
-              <a:rPr lang="de-DE" sz="1600" dirty="0">
+              <a:rPr lang="de-DE" dirty="0">
                 <a:latin typeface="Calibri" panose="020F0502020204030204" charset="0"/>
               </a:rPr>
               <a:t>Sammeln der Daten (Sensor)</a:t>
@@ -10566,7 +10566,7 @@
               <a:buChar char="-"/>
             </a:pPr>
             <a:r>
-              <a:rPr lang="de-DE" sz="1600" dirty="0">
+              <a:rPr lang="de-DE" dirty="0">
                 <a:latin typeface="Calibri" panose="020F0502020204030204" charset="0"/>
               </a:rPr>
               <a:t>Aufarbeitung der empfangenen Daten</a:t>
@@ -10578,7 +10578,7 @@
               <a:buChar char="-"/>
             </a:pPr>
             <a:r>
-              <a:rPr lang="de-DE" altLang="en-US" sz="1600" dirty="0">
+              <a:rPr lang="de-DE" altLang="en-US" dirty="0">
                 <a:latin typeface="Calibri" panose="020F0502020204030204" charset="0"/>
               </a:rPr>
               <a:t>Korrektes Discovery-Prinzip</a:t>
@@ -10590,18 +10590,18 @@
               <a:buChar char="-"/>
             </a:pPr>
             <a:r>
-              <a:rPr lang="de-DE" altLang="en-US" sz="1600" dirty="0">
+              <a:rPr lang="de-DE" altLang="en-US" dirty="0">
                 <a:latin typeface="Calibri" panose="020F0502020204030204" charset="0"/>
               </a:rPr>
               <a:t>Zusammensetzen zu einer einheitlichen </a:t>
             </a:r>
             <a:r>
-              <a:rPr lang="de-DE" altLang="en-US" sz="1600" dirty="0" err="1">
+              <a:rPr lang="de-DE" altLang="en-US" dirty="0" err="1">
                 <a:latin typeface="Calibri" panose="020F0502020204030204" charset="0"/>
               </a:rPr>
               <a:t>Map</a:t>
             </a:r>
-            <a:endParaRPr lang="de-DE" altLang="en-US" sz="1600" dirty="0">
+            <a:endParaRPr lang="de-DE" altLang="en-US" dirty="0">
               <a:latin typeface="Calibri" panose="020F0502020204030204" charset="0"/>
             </a:endParaRPr>
           </a:p>
@@ -10772,8 +10772,8 @@
         </p:nvSpPr>
         <p:spPr>
           <a:xfrm>
-            <a:off x="611560" y="1736229"/>
-            <a:ext cx="8223250" cy="4755148"/>
+            <a:off x="628650" y="1627774"/>
+            <a:ext cx="8223250" cy="5093702"/>
           </a:xfrm>
           <a:prstGeom prst="rect">
             <a:avLst/>
@@ -10812,7 +10812,7 @@
               <a:buNone/>
             </a:pPr>
             <a:r>
-              <a:rPr lang="de-DE" altLang="en-US" sz="1600" b="1" dirty="0">
+              <a:rPr lang="de-DE" altLang="en-US" b="1" dirty="0">
                 <a:latin typeface="Calibri" panose="020F0502020204030204" charset="0"/>
               </a:rPr>
               <a:t>Fahrstreckenlogik</a:t>
@@ -10824,7 +10824,7 @@
               <a:buChar char="ü"/>
             </a:pPr>
             <a:r>
-              <a:rPr lang="de-DE" altLang="en-US" sz="1600" dirty="0">
+              <a:rPr lang="de-DE" altLang="en-US" dirty="0">
                 <a:solidFill>
                   <a:srgbClr val="00B050"/>
                 </a:solidFill>
@@ -10839,7 +10839,7 @@
               <a:buChar char="ü"/>
             </a:pPr>
             <a:r>
-              <a:rPr lang="de-DE" altLang="en-US" sz="1600" dirty="0">
+              <a:rPr lang="de-DE" altLang="en-US" dirty="0">
                 <a:solidFill>
                   <a:srgbClr val="00B050"/>
                 </a:solidFill>
@@ -10854,7 +10854,7 @@
               <a:buChar char="ü"/>
             </a:pPr>
             <a:r>
-              <a:rPr lang="de-DE" altLang="en-US" sz="1600" dirty="0">
+              <a:rPr lang="de-DE" altLang="en-US" dirty="0">
                 <a:solidFill>
                   <a:srgbClr val="00B050"/>
                 </a:solidFill>
@@ -10869,7 +10869,7 @@
               <a:buChar char="ü"/>
             </a:pPr>
             <a:r>
-              <a:rPr lang="de-DE" altLang="en-US" sz="1600" dirty="0">
+              <a:rPr lang="de-DE" altLang="en-US" dirty="0">
                 <a:solidFill>
                   <a:srgbClr val="00B050"/>
                 </a:solidFill>
@@ -10884,7 +10884,7 @@
               <a:buChar char="ü"/>
             </a:pPr>
             <a:r>
-              <a:rPr lang="de-DE" altLang="en-US" sz="1600" dirty="0">
+              <a:rPr lang="de-DE" altLang="en-US" dirty="0">
                 <a:solidFill>
                   <a:srgbClr val="00B050"/>
                 </a:solidFill>
@@ -10899,7 +10899,7 @@
               <a:buChar char="ü"/>
             </a:pPr>
             <a:r>
-              <a:rPr lang="de-DE" altLang="en-US" sz="1600" dirty="0">
+              <a:rPr lang="de-DE" altLang="en-US" dirty="0">
                 <a:solidFill>
                   <a:srgbClr val="00B050"/>
                 </a:solidFill>
@@ -10908,7 +10908,7 @@
               <a:t>Swagger-Seite für </a:t>
             </a:r>
             <a:r>
-              <a:rPr lang="de-DE" altLang="en-US" sz="1600" dirty="0" err="1">
+              <a:rPr lang="de-DE" altLang="en-US" dirty="0" err="1">
                 <a:solidFill>
                   <a:srgbClr val="00B050"/>
                 </a:solidFill>
@@ -10917,7 +10917,7 @@
               <a:t>Endpoint</a:t>
             </a:r>
             <a:r>
-              <a:rPr lang="de-DE" altLang="en-US" sz="1600" dirty="0">
+              <a:rPr lang="de-DE" altLang="en-US" dirty="0">
                 <a:solidFill>
                   <a:srgbClr val="00B050"/>
                 </a:solidFill>
@@ -10931,7 +10931,7 @@
               <a:buFont typeface="Wingdings" panose="05000000000000000000" pitchFamily="2" charset="2"/>
               <a:buChar char="ü"/>
             </a:pPr>
-            <a:endParaRPr lang="de-DE" altLang="en-US" sz="1600" dirty="0">
+            <a:endParaRPr lang="de-DE" altLang="en-US" dirty="0">
               <a:solidFill>
                 <a:srgbClr val="00B050"/>
               </a:solidFill>
@@ -10943,18 +10943,18 @@
               <a:buFontTx/>
               <a:buChar char="-"/>
             </a:pPr>
-            <a:endParaRPr lang="de-DE" altLang="en-US" sz="1600" dirty="0">
+            <a:endParaRPr lang="de-DE" altLang="en-US" dirty="0">
               <a:latin typeface="Calibri" panose="020F0502020204030204" charset="0"/>
             </a:endParaRPr>
           </a:p>
           <a:p>
-            <a:endParaRPr lang="de-DE" altLang="en-US" sz="1600" dirty="0">
+            <a:endParaRPr lang="de-DE" altLang="en-US" dirty="0">
               <a:latin typeface="Calibri" panose="020F0502020204030204" charset="0"/>
             </a:endParaRPr>
           </a:p>
           <a:p>
             <a:r>
-              <a:rPr lang="de-DE" altLang="en-US" sz="1600" b="1" dirty="0">
+              <a:rPr lang="de-DE" altLang="en-US" b="1" dirty="0">
                 <a:latin typeface="Calibri" panose="020F0502020204030204" charset="0"/>
               </a:rPr>
               <a:t>Discovery-Mode / Kartographie</a:t>
@@ -10966,7 +10966,7 @@
               <a:buChar char="ü"/>
             </a:pPr>
             <a:r>
-              <a:rPr lang="de-DE" sz="1600" dirty="0">
+              <a:rPr lang="de-DE" dirty="0">
                 <a:solidFill>
                   <a:srgbClr val="00B050"/>
                 </a:solidFill>
@@ -10981,7 +10981,7 @@
               <a:buChar char="ü"/>
             </a:pPr>
             <a:r>
-              <a:rPr lang="de-DE" sz="1600" dirty="0">
+              <a:rPr lang="de-DE" dirty="0">
                 <a:solidFill>
                   <a:srgbClr val="00B050"/>
                 </a:solidFill>
@@ -10996,7 +10996,7 @@
               <a:buChar char="ü"/>
             </a:pPr>
             <a:r>
-              <a:rPr lang="de-DE" altLang="en-US" sz="1600" dirty="0">
+              <a:rPr lang="de-DE" altLang="en-US" dirty="0">
                 <a:solidFill>
                   <a:srgbClr val="FFC000"/>
                 </a:solidFill>
@@ -11011,7 +11011,7 @@
               <a:buChar char="ü"/>
             </a:pPr>
             <a:r>
-              <a:rPr lang="de-DE" altLang="en-US" sz="1600" dirty="0">
+              <a:rPr lang="de-DE" altLang="en-US" dirty="0">
                 <a:solidFill>
                   <a:srgbClr val="FFC000"/>
                 </a:solidFill>
@@ -11020,7 +11020,7 @@
               <a:t>Zusammensetzen zu einer einheitlichen </a:t>
             </a:r>
             <a:r>
-              <a:rPr lang="de-DE" altLang="en-US" sz="1600" dirty="0" err="1">
+              <a:rPr lang="de-DE" altLang="en-US" dirty="0" err="1">
                 <a:solidFill>
                   <a:srgbClr val="FFC000"/>
                 </a:solidFill>
@@ -11028,7 +11028,7 @@
               </a:rPr>
               <a:t>Map</a:t>
             </a:r>
-            <a:endParaRPr lang="de-DE" altLang="en-US" sz="1600" dirty="0">
+            <a:endParaRPr lang="de-DE" altLang="en-US" dirty="0">
               <a:solidFill>
                 <a:srgbClr val="FFC000"/>
               </a:solidFill>
@@ -13723,18 +13723,18 @@
 </file>
 
 <file path=customXml/item1.xml><?xml version="1.0" encoding="utf-8"?>
+<p:properties xmlns:p="http://schemas.microsoft.com/office/2006/metadata/properties" xmlns:xsi="http://www.w3.org/2001/XMLSchema-instance" xmlns:pc="http://schemas.microsoft.com/office/infopath/2007/PartnerControls">
+  <documentManagement/>
+</p:properties>
+</file>
+
+<file path=customXml/item2.xml><?xml version="1.0" encoding="utf-8"?>
 <?mso-contentType ?>
 <FormTemplates xmlns="http://schemas.microsoft.com/sharepoint/v3/contenttype/forms">
   <Display>DocumentLibraryForm</Display>
   <Edit>DocumentLibraryForm</Edit>
   <New>DocumentLibraryForm</New>
 </FormTemplates>
-</file>
-
-<file path=customXml/item2.xml><?xml version="1.0" encoding="utf-8"?>
-<p:properties xmlns:p="http://schemas.microsoft.com/office/2006/metadata/properties" xmlns:xsi="http://www.w3.org/2001/XMLSchema-instance" xmlns:pc="http://schemas.microsoft.com/office/infopath/2007/PartnerControls">
-  <documentManagement/>
-</p:properties>
 </file>
 
 <file path=customXml/item3.xml><?xml version="1.0" encoding="utf-8"?>
@@ -13882,14 +13882,6 @@
 </file>
 
 <file path=customXml/itemProps1.xml><?xml version="1.0" encoding="utf-8"?>
-<ds:datastoreItem xmlns:ds="http://schemas.openxmlformats.org/officeDocument/2006/customXml" ds:itemID="{1981A0EB-802E-4D0E-9A2A-3AE4F15204D8}">
-  <ds:schemaRefs>
-    <ds:schemaRef ds:uri="http://schemas.microsoft.com/sharepoint/v3/contenttype/forms"/>
-  </ds:schemaRefs>
-</ds:datastoreItem>
-</file>
-
-<file path=customXml/itemProps2.xml><?xml version="1.0" encoding="utf-8"?>
 <ds:datastoreItem xmlns:ds="http://schemas.openxmlformats.org/officeDocument/2006/customXml" ds:itemID="{8354EFAF-31A0-41ED-A74D-DAE704B6C081}">
   <ds:schemaRefs>
     <ds:schemaRef ds:uri="http://schemas.openxmlformats.org/package/2006/metadata/core-properties"/>
@@ -13901,6 +13893,14 @@
     <ds:schemaRef ds:uri="http://schemas.microsoft.com/office/2006/metadata/properties"/>
     <ds:schemaRef ds:uri="http://purl.org/dc/dcmitype/"/>
     <ds:schemaRef ds:uri="http://purl.org/dc/terms/"/>
+  </ds:schemaRefs>
+</ds:datastoreItem>
+</file>
+
+<file path=customXml/itemProps2.xml><?xml version="1.0" encoding="utf-8"?>
+<ds:datastoreItem xmlns:ds="http://schemas.openxmlformats.org/officeDocument/2006/customXml" ds:itemID="{1981A0EB-802E-4D0E-9A2A-3AE4F15204D8}">
+  <ds:schemaRefs>
+    <ds:schemaRef ds:uri="http://schemas.microsoft.com/sharepoint/v3/contenttype/forms"/>
   </ds:schemaRefs>
 </ds:datastoreItem>
 </file>

</xml_diff>

<commit_message>
Implement the unsaved progress from the Sprint Review
</commit_message>
<xml_diff>
--- a/02_Backend/!_Docs/INF4_SYP_Gruppe1_Sprint3_Review.pptx
+++ b/02_Backend/!_Docs/INF4_SYP_Gruppe1_Sprint3_Review.pptx
@@ -5,23 +5,24 @@
     <p:sldMasterId id="2147483648" r:id="rId4"/>
   </p:sldMasterIdLst>
   <p:notesMasterIdLst>
-    <p:notesMasterId r:id="rId16"/>
+    <p:notesMasterId r:id="rId17"/>
   </p:notesMasterIdLst>
   <p:handoutMasterIdLst>
-    <p:handoutMasterId r:id="rId17"/>
+    <p:handoutMasterId r:id="rId18"/>
   </p:handoutMasterIdLst>
   <p:sldIdLst>
     <p:sldId id="361" r:id="rId5"/>
     <p:sldId id="582" r:id="rId6"/>
     <p:sldId id="586" r:id="rId7"/>
-    <p:sldId id="592" r:id="rId8"/>
-    <p:sldId id="570" r:id="rId9"/>
-    <p:sldId id="585" r:id="rId10"/>
-    <p:sldId id="584" r:id="rId11"/>
-    <p:sldId id="583" r:id="rId12"/>
-    <p:sldId id="593" r:id="rId13"/>
-    <p:sldId id="588" r:id="rId14"/>
-    <p:sldId id="587" r:id="rId15"/>
+    <p:sldId id="594" r:id="rId8"/>
+    <p:sldId id="592" r:id="rId9"/>
+    <p:sldId id="570" r:id="rId10"/>
+    <p:sldId id="585" r:id="rId11"/>
+    <p:sldId id="584" r:id="rId12"/>
+    <p:sldId id="583" r:id="rId13"/>
+    <p:sldId id="593" r:id="rId14"/>
+    <p:sldId id="588" r:id="rId15"/>
+    <p:sldId id="587" r:id="rId16"/>
   </p:sldIdLst>
   <p:sldSz cx="9144000" cy="6858000" type="screen4x3"/>
   <p:notesSz cx="7099300" cy="10234613"/>
@@ -4093,7 +4094,7 @@
           <a:p>
             <a:fld id="{18D8EB10-9094-CC46-9BCA-615730AD1A2C}" type="slidenum">
               <a:rPr lang="en-US" smtClean="0"/>
-              <a:t>8</a:t>
+              <a:t>9</a:t>
             </a:fld>
             <a:endParaRPr lang="en-US"/>
           </a:p>
@@ -4201,7 +4202,7 @@
           <a:p>
             <a:fld id="{18D8EB10-9094-CC46-9BCA-615730AD1A2C}" type="slidenum">
               <a:rPr lang="en-US" smtClean="0"/>
-              <a:t>10</a:t>
+              <a:t>11</a:t>
             </a:fld>
             <a:endParaRPr lang="en-US"/>
           </a:p>
@@ -8410,6 +8411,258 @@
   <p:cSld>
     <p:spTree>
       <p:nvGrpSpPr>
+        <p:cNvPr id="1" name=""/>
+        <p:cNvGrpSpPr/>
+        <p:nvPr/>
+      </p:nvGrpSpPr>
+      <p:grpSpPr>
+        <a:xfrm>
+          <a:off x="0" y="0"/>
+          <a:ext cx="0" cy="0"/>
+          <a:chOff x="0" y="0"/>
+          <a:chExt cx="0" cy="0"/>
+        </a:xfrm>
+      </p:grpSpPr>
+      <p:sp>
+        <p:nvSpPr>
+          <p:cNvPr id="2" name="Titel 1">
+            <a:extLst>
+              <a:ext uri="{FF2B5EF4-FFF2-40B4-BE49-F238E27FC236}">
+                <a16:creationId xmlns:a16="http://schemas.microsoft.com/office/drawing/2014/main" id="{5803B18A-F36F-08C7-B620-C08FA27E2E54}"/>
+              </a:ext>
+            </a:extLst>
+          </p:cNvPr>
+          <p:cNvSpPr>
+            <a:spLocks noGrp="1"/>
+          </p:cNvSpPr>
+          <p:nvPr>
+            <p:ph type="title"/>
+          </p:nvPr>
+        </p:nvSpPr>
+        <p:spPr/>
+        <p:txBody>
+          <a:bodyPr/>
+          <a:lstStyle/>
+          <a:p>
+            <a:r>
+              <a:rPr lang="de-AT" dirty="0"/>
+              <a:t>Spike-Story – „Discovery-Mode“</a:t>
+            </a:r>
+          </a:p>
+        </p:txBody>
+      </p:sp>
+      <p:sp>
+        <p:nvSpPr>
+          <p:cNvPr id="3" name="Inhaltsplatzhalter 2">
+            <a:extLst>
+              <a:ext uri="{FF2B5EF4-FFF2-40B4-BE49-F238E27FC236}">
+                <a16:creationId xmlns:a16="http://schemas.microsoft.com/office/drawing/2014/main" id="{CC72A9FA-848B-2740-6D96-BA53A545324E}"/>
+              </a:ext>
+            </a:extLst>
+          </p:cNvPr>
+          <p:cNvSpPr>
+            <a:spLocks noGrp="1"/>
+          </p:cNvSpPr>
+          <p:nvPr>
+            <p:ph idx="1"/>
+          </p:nvPr>
+        </p:nvSpPr>
+        <p:spPr/>
+        <p:txBody>
+          <a:bodyPr>
+            <a:normAutofit/>
+          </a:bodyPr>
+          <a:lstStyle/>
+          <a:p>
+            <a:pPr marL="0" indent="0">
+              <a:buNone/>
+            </a:pPr>
+            <a:r>
+              <a:rPr lang="de-AT" sz="2400" b="1" dirty="0"/>
+              <a:t>Timeboxing</a:t>
+            </a:r>
+          </a:p>
+          <a:p>
+            <a:r>
+              <a:rPr lang="de-AT" sz="1900" dirty="0"/>
+              <a:t>3 Wochen für Algorithmus zum Abfahren der Strecke, Sammeln der Daten (Sensor) und Karten-Mapping  </a:t>
+            </a:r>
+          </a:p>
+          <a:p>
+            <a:pPr marL="0" indent="0">
+              <a:buNone/>
+            </a:pPr>
+            <a:r>
+              <a:rPr lang="de-AT" sz="2400" b="1" dirty="0"/>
+              <a:t>Prototypen / Variantenbildung</a:t>
+            </a:r>
+          </a:p>
+          <a:p>
+            <a:r>
+              <a:rPr lang="de-AT" sz="1900" b="1" dirty="0"/>
+              <a:t> </a:t>
+            </a:r>
+            <a:r>
+              <a:rPr lang="de-AT" sz="1900" dirty="0"/>
+              <a:t>BFS (Breitensuche)</a:t>
+            </a:r>
+          </a:p>
+          <a:p>
+            <a:r>
+              <a:rPr lang="de-AT" sz="1900" dirty="0"/>
+              <a:t> DFS (Tiefensuche)</a:t>
+            </a:r>
+          </a:p>
+          <a:p>
+            <a:r>
+              <a:rPr lang="de-AT" sz="1900" dirty="0"/>
+              <a:t> A</a:t>
+            </a:r>
+            <a:r>
+              <a:rPr lang="de-DE" sz="1900" dirty="0"/>
+              <a:t>(A-Stern)</a:t>
+            </a:r>
+            <a:r>
+              <a:rPr lang="de-AT" sz="1900" dirty="0"/>
+              <a:t>*</a:t>
+            </a:r>
+          </a:p>
+          <a:p>
+            <a:r>
+              <a:rPr lang="de-AT" sz="1900" dirty="0"/>
+              <a:t> </a:t>
+            </a:r>
+            <a:r>
+              <a:rPr lang="de-DE" sz="1900" dirty="0"/>
+              <a:t>Neander Förmig</a:t>
+            </a:r>
+            <a:endParaRPr lang="de-AT" sz="1900" b="1" dirty="0"/>
+          </a:p>
+          <a:p>
+            <a:pPr marL="0" indent="0">
+              <a:buNone/>
+            </a:pPr>
+            <a:r>
+              <a:rPr lang="de-AT" sz="2400" b="1" dirty="0"/>
+              <a:t>Lösungsansatze</a:t>
+            </a:r>
+          </a:p>
+          <a:p>
+            <a:r>
+              <a:rPr lang="de-AT" sz="1900" dirty="0"/>
+              <a:t>Alte Ansätze wurden verworfen -&gt; zu kompliziert</a:t>
+            </a:r>
+          </a:p>
+          <a:p>
+            <a:r>
+              <a:rPr lang="de-AT" sz="1900" dirty="0"/>
+              <a:t>Herr Prof. Aigner-Ansatz verwendet -&gt; SLAM-Ansatz</a:t>
+            </a:r>
+          </a:p>
+          <a:p>
+            <a:pPr marL="0" indent="0">
+              <a:buNone/>
+            </a:pPr>
+            <a:endParaRPr lang="de-AT" sz="2000" dirty="0"/>
+          </a:p>
+          <a:p>
+            <a:endParaRPr lang="de-AT" sz="2000" dirty="0"/>
+          </a:p>
+          <a:p>
+            <a:pPr marL="0" indent="0">
+              <a:buNone/>
+            </a:pPr>
+            <a:endParaRPr lang="de-AT" sz="2400" b="1" dirty="0"/>
+          </a:p>
+          <a:p>
+            <a:pPr marL="0" indent="0">
+              <a:buNone/>
+            </a:pPr>
+            <a:endParaRPr lang="de-AT" sz="2400" b="1" dirty="0"/>
+          </a:p>
+        </p:txBody>
+      </p:sp>
+      <p:sp>
+        <p:nvSpPr>
+          <p:cNvPr id="4" name="Fußzeilenplatzhalter 3">
+            <a:extLst>
+              <a:ext uri="{FF2B5EF4-FFF2-40B4-BE49-F238E27FC236}">
+                <a16:creationId xmlns:a16="http://schemas.microsoft.com/office/drawing/2014/main" id="{06AD5292-0EDF-8AD0-CDB4-D5CA095C0898}"/>
+              </a:ext>
+            </a:extLst>
+          </p:cNvPr>
+          <p:cNvSpPr>
+            <a:spLocks noGrp="1"/>
+          </p:cNvSpPr>
+          <p:nvPr>
+            <p:ph type="ftr" sz="quarter" idx="11"/>
+          </p:nvPr>
+        </p:nvSpPr>
+        <p:spPr/>
+        <p:txBody>
+          <a:bodyPr/>
+          <a:lstStyle/>
+          <a:p>
+            <a:pPr>
+              <a:defRPr/>
+            </a:pPr>
+            <a:r>
+              <a:rPr lang="de-DE"/>
+              <a:t>DI(FH) Falkensteiner Markus</a:t>
+            </a:r>
+          </a:p>
+        </p:txBody>
+      </p:sp>
+      <p:sp>
+        <p:nvSpPr>
+          <p:cNvPr id="5" name="Foliennummernplatzhalter 4">
+            <a:extLst>
+              <a:ext uri="{FF2B5EF4-FFF2-40B4-BE49-F238E27FC236}">
+                <a16:creationId xmlns:a16="http://schemas.microsoft.com/office/drawing/2014/main" id="{93C5FC72-C180-563A-216A-63A471935926}"/>
+              </a:ext>
+            </a:extLst>
+          </p:cNvPr>
+          <p:cNvSpPr>
+            <a:spLocks noGrp="1"/>
+          </p:cNvSpPr>
+          <p:nvPr>
+            <p:ph type="sldNum" sz="quarter" idx="12"/>
+          </p:nvPr>
+        </p:nvSpPr>
+        <p:spPr/>
+        <p:txBody>
+          <a:bodyPr/>
+          <a:lstStyle/>
+          <a:p>
+            <a:pPr>
+              <a:defRPr/>
+            </a:pPr>
+            <a:fld id="{AE4538FE-AEB4-413B-B741-EC1BAEEF6B8F}" type="slidenum">
+              <a:rPr lang="de-AT" smtClean="0"/>
+              <a:t>10</a:t>
+            </a:fld>
+            <a:endParaRPr lang="de-AT"/>
+          </a:p>
+        </p:txBody>
+      </p:sp>
+    </p:spTree>
+    <p:extLst>
+      <p:ext uri="{BB962C8B-B14F-4D97-AF65-F5344CB8AC3E}">
+        <p14:creationId xmlns:p14="http://schemas.microsoft.com/office/powerpoint/2010/main" val="95285380"/>
+      </p:ext>
+    </p:extLst>
+  </p:cSld>
+  <p:clrMapOvr>
+    <a:masterClrMapping/>
+  </p:clrMapOvr>
+</p:sld>
+</file>
+
+<file path=ppt/slides/slide11.xml><?xml version="1.0" encoding="utf-8"?>
+<p:sld xmlns:a="http://schemas.openxmlformats.org/drawingml/2006/main" xmlns:r="http://schemas.openxmlformats.org/officeDocument/2006/relationships" xmlns:p="http://schemas.openxmlformats.org/presentationml/2006/main">
+  <p:cSld>
+    <p:spTree>
+      <p:nvGrpSpPr>
         <p:cNvPr id="1" name="">
           <a:extLst>
             <a:ext uri="{FF2B5EF4-FFF2-40B4-BE49-F238E27FC236}">
@@ -8970,7 +9223,7 @@
             </a:pPr>
             <a:fld id="{AE4538FE-AEB4-413B-B741-EC1BAEEF6B8F}" type="slidenum">
               <a:rPr lang="de-AT" smtClean="0"/>
-              <a:t>10</a:t>
+              <a:t>11</a:t>
             </a:fld>
             <a:endParaRPr lang="de-AT"/>
           </a:p>
@@ -9001,7 +9254,7 @@
 </p:sld>
 </file>
 
-<file path=ppt/slides/slide11.xml><?xml version="1.0" encoding="utf-8"?>
+<file path=ppt/slides/slide12.xml><?xml version="1.0" encoding="utf-8"?>
 <p:sld xmlns:a="http://schemas.openxmlformats.org/drawingml/2006/main" xmlns:r="http://schemas.openxmlformats.org/officeDocument/2006/relationships" xmlns:p="http://schemas.openxmlformats.org/presentationml/2006/main">
   <p:cSld>
     <p:spTree>
@@ -9103,7 +9356,7 @@
             </a:pPr>
             <a:fld id="{AE4538FE-AEB4-413B-B741-EC1BAEEF6B8F}" type="slidenum">
               <a:rPr lang="de-AT" smtClean="0"/>
-              <a:t>11</a:t>
+              <a:t>12</a:t>
             </a:fld>
             <a:endParaRPr lang="de-AT"/>
           </a:p>
@@ -10650,6 +10903,424 @@
         <p:cNvPr id="1" name="">
           <a:extLst>
             <a:ext uri="{FF2B5EF4-FFF2-40B4-BE49-F238E27FC236}">
+              <a16:creationId xmlns:a16="http://schemas.microsoft.com/office/drawing/2014/main" id="{BF250A10-A36E-8EF1-054D-4532944CAFF2}"/>
+            </a:ext>
+          </a:extLst>
+        </p:cNvPr>
+        <p:cNvGrpSpPr/>
+        <p:nvPr/>
+      </p:nvGrpSpPr>
+      <p:grpSpPr>
+        <a:xfrm>
+          <a:off x="0" y="0"/>
+          <a:ext cx="0" cy="0"/>
+          <a:chOff x="0" y="0"/>
+          <a:chExt cx="0" cy="0"/>
+        </a:xfrm>
+      </p:grpSpPr>
+      <p:sp>
+        <p:nvSpPr>
+          <p:cNvPr id="2" name="Title 1">
+            <a:extLst>
+              <a:ext uri="{FF2B5EF4-FFF2-40B4-BE49-F238E27FC236}">
+                <a16:creationId xmlns:a16="http://schemas.microsoft.com/office/drawing/2014/main" id="{9C815C2A-3613-6C69-4B63-3D13BA31FA43}"/>
+              </a:ext>
+            </a:extLst>
+          </p:cNvPr>
+          <p:cNvSpPr>
+            <a:spLocks noGrp="1"/>
+          </p:cNvSpPr>
+          <p:nvPr>
+            <p:ph type="title"/>
+          </p:nvPr>
+        </p:nvSpPr>
+        <p:spPr/>
+        <p:txBody>
+          <a:bodyPr/>
+          <a:lstStyle/>
+          <a:p>
+            <a:r>
+              <a:rPr lang="de-DE" altLang="en-US">
+                <a:cs typeface="+mj-lt"/>
+              </a:rPr>
+              <a:t>Sprint Review</a:t>
+            </a:r>
+          </a:p>
+        </p:txBody>
+      </p:sp>
+      <p:sp>
+        <p:nvSpPr>
+          <p:cNvPr id="8" name="Footer Placeholder 7">
+            <a:extLst>
+              <a:ext uri="{FF2B5EF4-FFF2-40B4-BE49-F238E27FC236}">
+                <a16:creationId xmlns:a16="http://schemas.microsoft.com/office/drawing/2014/main" id="{C7D3D7C0-730F-4F87-D5F5-2B646478EBB1}"/>
+              </a:ext>
+            </a:extLst>
+          </p:cNvPr>
+          <p:cNvSpPr>
+            <a:spLocks noGrp="1"/>
+          </p:cNvSpPr>
+          <p:nvPr>
+            <p:ph type="ftr" sz="quarter" idx="11"/>
+          </p:nvPr>
+        </p:nvSpPr>
+        <p:spPr/>
+        <p:txBody>
+          <a:bodyPr/>
+          <a:lstStyle/>
+          <a:p>
+            <a:pPr>
+              <a:defRPr/>
+            </a:pPr>
+            <a:r>
+              <a:rPr lang="de-DE"/>
+              <a:t>DI(FH) Falkensteiner Markus</a:t>
+            </a:r>
+          </a:p>
+        </p:txBody>
+      </p:sp>
+      <p:sp>
+        <p:nvSpPr>
+          <p:cNvPr id="9" name="Slide Number Placeholder 8">
+            <a:extLst>
+              <a:ext uri="{FF2B5EF4-FFF2-40B4-BE49-F238E27FC236}">
+                <a16:creationId xmlns:a16="http://schemas.microsoft.com/office/drawing/2014/main" id="{509AD8C2-6827-73FA-560E-F0D3D6078A38}"/>
+              </a:ext>
+            </a:extLst>
+          </p:cNvPr>
+          <p:cNvSpPr>
+            <a:spLocks noGrp="1"/>
+          </p:cNvSpPr>
+          <p:nvPr>
+            <p:ph type="sldNum" sz="quarter" idx="12"/>
+          </p:nvPr>
+        </p:nvSpPr>
+        <p:spPr/>
+        <p:txBody>
+          <a:bodyPr/>
+          <a:lstStyle/>
+          <a:p>
+            <a:pPr>
+              <a:defRPr/>
+            </a:pPr>
+            <a:fld id="{AE4538FE-AEB4-413B-B741-EC1BAEEF6B8F}" type="slidenum">
+              <a:rPr lang="de-AT" smtClean="0"/>
+              <a:t>4</a:t>
+            </a:fld>
+            <a:endParaRPr lang="de-AT"/>
+          </a:p>
+        </p:txBody>
+      </p:sp>
+      <p:sp>
+        <p:nvSpPr>
+          <p:cNvPr id="3" name="Text Box 2">
+            <a:extLst>
+              <a:ext uri="{FF2B5EF4-FFF2-40B4-BE49-F238E27FC236}">
+                <a16:creationId xmlns:a16="http://schemas.microsoft.com/office/drawing/2014/main" id="{EA74E566-AC06-E7D0-14A3-6AF694F2CE69}"/>
+              </a:ext>
+            </a:extLst>
+          </p:cNvPr>
+          <p:cNvSpPr txBox="1"/>
+          <p:nvPr/>
+        </p:nvSpPr>
+        <p:spPr>
+          <a:xfrm>
+            <a:off x="628650" y="1643163"/>
+            <a:ext cx="8223250" cy="5078313"/>
+          </a:xfrm>
+          <a:prstGeom prst="rect">
+            <a:avLst/>
+          </a:prstGeom>
+          <a:noFill/>
+        </p:spPr>
+        <p:txBody>
+          <a:bodyPr wrap="square" rtlCol="0">
+            <a:spAutoFit/>
+          </a:bodyPr>
+          <a:lstStyle/>
+          <a:p>
+            <a:pPr indent="0">
+              <a:buFont typeface="Arial" panose="020B0604020202020204" pitchFamily="34" charset="0"/>
+              <a:buNone/>
+            </a:pPr>
+            <a:r>
+              <a:rPr lang="de-DE" altLang="en-US" sz="2400" b="1" dirty="0">
+                <a:latin typeface="Calibri" panose="020F0502020204030204" charset="0"/>
+              </a:rPr>
+              <a:t>Sprint III – Zieldefinition</a:t>
+            </a:r>
+          </a:p>
+          <a:p>
+            <a:pPr indent="0">
+              <a:buFont typeface="Arial" panose="020B0604020202020204" pitchFamily="34" charset="0"/>
+              <a:buNone/>
+            </a:pPr>
+            <a:endParaRPr lang="de-DE" altLang="en-US" sz="1400" b="1" dirty="0">
+              <a:latin typeface="Calibri" panose="020F0502020204030204" charset="0"/>
+            </a:endParaRPr>
+          </a:p>
+          <a:p>
+            <a:pPr indent="0">
+              <a:buFont typeface="Arial" panose="020B0604020202020204" pitchFamily="34" charset="0"/>
+              <a:buNone/>
+            </a:pPr>
+            <a:r>
+              <a:rPr lang="de-DE" altLang="en-US" b="1" dirty="0">
+                <a:latin typeface="Calibri" panose="020F0502020204030204" charset="0"/>
+              </a:rPr>
+              <a:t>Fahrstreckenlogik</a:t>
+            </a:r>
+          </a:p>
+          <a:p>
+            <a:pPr marL="285750" indent="-285750">
+              <a:buFont typeface="Wingdings" panose="05000000000000000000" pitchFamily="2" charset="2"/>
+              <a:buChar char="ü"/>
+            </a:pPr>
+            <a:r>
+              <a:rPr lang="de-DE" altLang="en-US" dirty="0">
+                <a:solidFill>
+                  <a:srgbClr val="00B050"/>
+                </a:solidFill>
+                <a:latin typeface="Calibri" panose="020F0502020204030204" charset="0"/>
+              </a:rPr>
+              <a:t>Bestehende Verbindung zur DB</a:t>
+            </a:r>
+          </a:p>
+          <a:p>
+            <a:pPr marL="285750" indent="-285750">
+              <a:buFont typeface="Wingdings" panose="05000000000000000000" pitchFamily="2" charset="2"/>
+              <a:buChar char="ü"/>
+            </a:pPr>
+            <a:r>
+              <a:rPr lang="de-DE" altLang="en-US" dirty="0">
+                <a:solidFill>
+                  <a:srgbClr val="00B050"/>
+                </a:solidFill>
+                <a:latin typeface="Calibri" panose="020F0502020204030204" charset="0"/>
+              </a:rPr>
+              <a:t>Speicherung der abgefahrenen Strecken</a:t>
+            </a:r>
+          </a:p>
+          <a:p>
+            <a:pPr marL="285750" indent="-285750">
+              <a:buFont typeface="Wingdings" panose="05000000000000000000" pitchFamily="2" charset="2"/>
+              <a:buChar char="ü"/>
+            </a:pPr>
+            <a:r>
+              <a:rPr lang="de-DE" altLang="en-US" dirty="0">
+                <a:solidFill>
+                  <a:srgbClr val="00B050"/>
+                </a:solidFill>
+                <a:latin typeface="Calibri" panose="020F0502020204030204" charset="0"/>
+              </a:rPr>
+              <a:t>Speicherung der manuell erstellten Routen</a:t>
+            </a:r>
+          </a:p>
+          <a:p>
+            <a:pPr marL="285750" indent="-285750">
+              <a:buFont typeface="Wingdings" panose="05000000000000000000" pitchFamily="2" charset="2"/>
+              <a:buChar char="ü"/>
+            </a:pPr>
+            <a:r>
+              <a:rPr lang="de-DE" altLang="en-US" dirty="0">
+                <a:solidFill>
+                  <a:srgbClr val="00B050"/>
+                </a:solidFill>
+                <a:latin typeface="Calibri" panose="020F0502020204030204" charset="0"/>
+              </a:rPr>
+              <a:t>Abrufen / Abfahren der gespeicherten Routen</a:t>
+            </a:r>
+          </a:p>
+          <a:p>
+            <a:pPr marL="285750" indent="-285750">
+              <a:buFont typeface="Wingdings" panose="05000000000000000000" pitchFamily="2" charset="2"/>
+              <a:buChar char="ü"/>
+            </a:pPr>
+            <a:r>
+              <a:rPr lang="de-DE" altLang="en-US" dirty="0">
+                <a:solidFill>
+                  <a:srgbClr val="00B050"/>
+                </a:solidFill>
+                <a:latin typeface="Calibri" panose="020F0502020204030204" charset="0"/>
+              </a:rPr>
+              <a:t>Überschreiben / Löschen einer bereits gespeicherten Route</a:t>
+            </a:r>
+          </a:p>
+          <a:p>
+            <a:pPr marL="285750" indent="-285750">
+              <a:buFont typeface="Wingdings" panose="05000000000000000000" pitchFamily="2" charset="2"/>
+              <a:buChar char="ü"/>
+            </a:pPr>
+            <a:r>
+              <a:rPr lang="de-DE" altLang="en-US" dirty="0">
+                <a:solidFill>
+                  <a:srgbClr val="00B050"/>
+                </a:solidFill>
+                <a:latin typeface="Calibri" panose="020F0502020204030204" charset="0"/>
+              </a:rPr>
+              <a:t>Swagger-Seite für </a:t>
+            </a:r>
+            <a:r>
+              <a:rPr lang="de-DE" altLang="en-US" dirty="0" err="1">
+                <a:solidFill>
+                  <a:srgbClr val="00B050"/>
+                </a:solidFill>
+                <a:latin typeface="Calibri" panose="020F0502020204030204" charset="0"/>
+              </a:rPr>
+              <a:t>Endpoint</a:t>
+            </a:r>
+            <a:r>
+              <a:rPr lang="de-DE" altLang="en-US" dirty="0">
+                <a:solidFill>
+                  <a:srgbClr val="00B050"/>
+                </a:solidFill>
+                <a:latin typeface="Calibri" panose="020F0502020204030204" charset="0"/>
+              </a:rPr>
+              <a:t>-Visualisierung</a:t>
+            </a:r>
+          </a:p>
+          <a:p>
+            <a:pPr marL="285750" indent="-285750">
+              <a:buFontTx/>
+              <a:buChar char="-"/>
+            </a:pPr>
+            <a:endParaRPr lang="de-DE" altLang="en-US" dirty="0">
+              <a:latin typeface="Calibri" panose="020F0502020204030204" charset="0"/>
+            </a:endParaRPr>
+          </a:p>
+          <a:p>
+            <a:endParaRPr lang="de-DE" altLang="en-US" dirty="0">
+              <a:latin typeface="Calibri" panose="020F0502020204030204" charset="0"/>
+            </a:endParaRPr>
+          </a:p>
+          <a:p>
+            <a:r>
+              <a:rPr lang="de-DE" altLang="en-US" b="1" dirty="0">
+                <a:latin typeface="Calibri" panose="020F0502020204030204" charset="0"/>
+              </a:rPr>
+              <a:t>Discovery-Mode / Kartographie</a:t>
+            </a:r>
+          </a:p>
+          <a:p>
+            <a:pPr marL="285750" indent="-285750">
+              <a:buFont typeface="Wingdings" panose="05000000000000000000" pitchFamily="2" charset="2"/>
+              <a:buChar char="ü"/>
+            </a:pPr>
+            <a:r>
+              <a:rPr lang="de-DE" dirty="0">
+                <a:solidFill>
+                  <a:srgbClr val="00B050"/>
+                </a:solidFill>
+                <a:latin typeface="Calibri" panose="020F0502020204030204" charset="0"/>
+              </a:rPr>
+              <a:t>Sammeln der Daten (Sensor)</a:t>
+            </a:r>
+          </a:p>
+          <a:p>
+            <a:pPr marL="285750" indent="-285750">
+              <a:buFont typeface="Wingdings" panose="05000000000000000000" pitchFamily="2" charset="2"/>
+              <a:buChar char="ü"/>
+            </a:pPr>
+            <a:r>
+              <a:rPr lang="de-DE" dirty="0">
+                <a:solidFill>
+                  <a:srgbClr val="00B050"/>
+                </a:solidFill>
+                <a:latin typeface="Calibri" panose="020F0502020204030204" charset="0"/>
+              </a:rPr>
+              <a:t>Aufarbeitung der empfangenen Daten</a:t>
+            </a:r>
+          </a:p>
+          <a:p>
+            <a:pPr marL="285750" indent="-285750">
+              <a:buFont typeface="Symbol" panose="05050102010706020507" pitchFamily="18" charset="2"/>
+              <a:buChar char="-"/>
+            </a:pPr>
+            <a:r>
+              <a:rPr lang="de-DE" altLang="en-US" dirty="0">
+                <a:solidFill>
+                  <a:srgbClr val="FFC000"/>
+                </a:solidFill>
+                <a:latin typeface="Calibri" panose="020F0502020204030204" charset="0"/>
+              </a:rPr>
+              <a:t>Korrektes Discovery-Prinzip</a:t>
+            </a:r>
+          </a:p>
+          <a:p>
+            <a:pPr marL="285750" indent="-285750">
+              <a:buFont typeface="Symbol" panose="05050102010706020507" pitchFamily="18" charset="2"/>
+              <a:buChar char="-"/>
+            </a:pPr>
+            <a:r>
+              <a:rPr lang="de-DE" altLang="en-US" dirty="0">
+                <a:solidFill>
+                  <a:srgbClr val="FFC000"/>
+                </a:solidFill>
+                <a:latin typeface="Calibri" panose="020F0502020204030204" charset="0"/>
+              </a:rPr>
+              <a:t>Zusammensetzen zu einer einheitlichen </a:t>
+            </a:r>
+            <a:r>
+              <a:rPr lang="de-DE" altLang="en-US" dirty="0" err="1">
+                <a:solidFill>
+                  <a:srgbClr val="FFC000"/>
+                </a:solidFill>
+                <a:latin typeface="Calibri" panose="020F0502020204030204" charset="0"/>
+              </a:rPr>
+              <a:t>Map</a:t>
+            </a:r>
+            <a:endParaRPr lang="de-DE" altLang="en-US" dirty="0">
+              <a:solidFill>
+                <a:srgbClr val="FFC000"/>
+              </a:solidFill>
+              <a:latin typeface="Calibri" panose="020F0502020204030204" charset="0"/>
+            </a:endParaRPr>
+          </a:p>
+          <a:p>
+            <a:endParaRPr lang="de-DE" sz="1700" dirty="0">
+              <a:latin typeface="Calibri" panose="020F0502020204030204" charset="0"/>
+            </a:endParaRPr>
+          </a:p>
+          <a:p>
+            <a:endParaRPr lang="de-DE" sz="1700" dirty="0">
+              <a:latin typeface="Calibri" panose="020F0502020204030204" charset="0"/>
+            </a:endParaRPr>
+          </a:p>
+        </p:txBody>
+      </p:sp>
+    </p:spTree>
+    <p:extLst>
+      <p:ext uri="{BB962C8B-B14F-4D97-AF65-F5344CB8AC3E}">
+        <p14:creationId xmlns:p14="http://schemas.microsoft.com/office/powerpoint/2010/main" val="1882784658"/>
+      </p:ext>
+    </p:extLst>
+  </p:cSld>
+  <p:clrMapOvr>
+    <a:masterClrMapping/>
+  </p:clrMapOvr>
+  <mc:AlternateContent xmlns:mc="http://schemas.openxmlformats.org/markup-compatibility/2006">
+    <mc:Choice xmlns:p14="http://schemas.microsoft.com/office/powerpoint/2010/main" Requires="p14">
+      <p:transition spd="med" p14:dur="700">
+        <p:fade/>
+      </p:transition>
+    </mc:Choice>
+    <mc:Fallback>
+      <p:transition spd="med">
+        <p:fade/>
+      </p:transition>
+    </mc:Fallback>
+  </mc:AlternateContent>
+</p:sld>
+</file>
+
+<file path=ppt/slides/slide5.xml><?xml version="1.0" encoding="utf-8"?>
+<p:sld xmlns:a="http://schemas.openxmlformats.org/drawingml/2006/main" xmlns:r="http://schemas.openxmlformats.org/officeDocument/2006/relationships" xmlns:p="http://schemas.openxmlformats.org/presentationml/2006/main">
+  <p:cSld>
+    <p:spTree>
+      <p:nvGrpSpPr>
+        <p:cNvPr id="1" name="">
+          <a:extLst>
+            <a:ext uri="{FF2B5EF4-FFF2-40B4-BE49-F238E27FC236}">
               <a16:creationId xmlns:a16="http://schemas.microsoft.com/office/drawing/2014/main" id="{9CF753E9-6166-CF3D-3EE1-DB4107F38D22}"/>
             </a:ext>
           </a:extLst>
@@ -10752,7 +11423,7 @@
             </a:pPr>
             <a:fld id="{AE4538FE-AEB4-413B-B741-EC1BAEEF6B8F}" type="slidenum">
               <a:rPr lang="de-AT" smtClean="0"/>
-              <a:t>4</a:t>
+              <a:t>5</a:t>
             </a:fld>
             <a:endParaRPr lang="de-AT"/>
           </a:p>
@@ -11067,7 +11738,7 @@
 </p:sld>
 </file>
 
-<file path=ppt/slides/slide5.xml><?xml version="1.0" encoding="utf-8"?>
+<file path=ppt/slides/slide6.xml><?xml version="1.0" encoding="utf-8"?>
 <p:sld xmlns:a="http://schemas.openxmlformats.org/drawingml/2006/main" xmlns:r="http://schemas.openxmlformats.org/officeDocument/2006/relationships" xmlns:p="http://schemas.openxmlformats.org/presentationml/2006/main">
   <p:cSld>
     <p:spTree>
@@ -11230,7 +11901,7 @@
             </a:pPr>
             <a:fld id="{AE4538FE-AEB4-413B-B741-EC1BAEEF6B8F}" type="slidenum">
               <a:rPr lang="de-AT" smtClean="0"/>
-              <a:t>5</a:t>
+              <a:t>6</a:t>
             </a:fld>
             <a:endParaRPr lang="de-AT"/>
           </a:p>
@@ -11286,7 +11957,7 @@
 </p:sld>
 </file>
 
-<file path=ppt/slides/slide6.xml><?xml version="1.0" encoding="utf-8"?>
+<file path=ppt/slides/slide7.xml><?xml version="1.0" encoding="utf-8"?>
 <p:sld xmlns:a="http://schemas.openxmlformats.org/drawingml/2006/main" xmlns:r="http://schemas.openxmlformats.org/officeDocument/2006/relationships" xmlns:p="http://schemas.openxmlformats.org/presentationml/2006/main">
   <p:cSld>
     <p:spTree>
@@ -11435,7 +12106,7 @@
                 </a:spcAft>
                 <a:defRPr/>
               </a:pPr>
-              <a:t>6</a:t>
+              <a:t>7</a:t>
             </a:fld>
             <a:endParaRPr lang="de-AT"/>
           </a:p>
@@ -11496,7 +12167,7 @@
 </p:sld>
 </file>
 
-<file path=ppt/slides/slide7.xml><?xml version="1.0" encoding="utf-8"?>
+<file path=ppt/slides/slide8.xml><?xml version="1.0" encoding="utf-8"?>
 <p:sld xmlns:a="http://schemas.openxmlformats.org/drawingml/2006/main" xmlns:r="http://schemas.openxmlformats.org/officeDocument/2006/relationships" xmlns:p="http://schemas.openxmlformats.org/presentationml/2006/main">
   <p:cSld>
     <p:spTree>
@@ -11643,7 +12314,7 @@
             </a:pPr>
             <a:fld id="{AE4538FE-AEB4-413B-B741-EC1BAEEF6B8F}" type="slidenum">
               <a:rPr lang="de-AT" smtClean="0"/>
-              <a:t>7</a:t>
+              <a:t>8</a:t>
             </a:fld>
             <a:endParaRPr lang="de-AT"/>
           </a:p>
@@ -11729,7 +12400,7 @@
 </p:sld>
 </file>
 
-<file path=ppt/slides/slide8.xml><?xml version="1.0" encoding="utf-8"?>
+<file path=ppt/slides/slide9.xml><?xml version="1.0" encoding="utf-8"?>
 <p:sld xmlns:a="http://schemas.openxmlformats.org/drawingml/2006/main" xmlns:r="http://schemas.openxmlformats.org/officeDocument/2006/relationships" xmlns:p="http://schemas.openxmlformats.org/presentationml/2006/main">
   <p:cSld>
     <p:spTree>
@@ -12019,7 +12690,7 @@
             </a:pPr>
             <a:fld id="{AE4538FE-AEB4-413B-B741-EC1BAEEF6B8F}" type="slidenum">
               <a:rPr lang="de-AT" smtClean="0"/>
-              <a:t>8</a:t>
+              <a:t>9</a:t>
             </a:fld>
             <a:endParaRPr lang="de-AT"/>
           </a:p>
@@ -12657,258 +13328,6 @@
       </p:par>
     </p:tnLst>
   </p:timing>
-</p:sld>
-</file>
-
-<file path=ppt/slides/slide9.xml><?xml version="1.0" encoding="utf-8"?>
-<p:sld xmlns:a="http://schemas.openxmlformats.org/drawingml/2006/main" xmlns:r="http://schemas.openxmlformats.org/officeDocument/2006/relationships" xmlns:p="http://schemas.openxmlformats.org/presentationml/2006/main">
-  <p:cSld>
-    <p:spTree>
-      <p:nvGrpSpPr>
-        <p:cNvPr id="1" name=""/>
-        <p:cNvGrpSpPr/>
-        <p:nvPr/>
-      </p:nvGrpSpPr>
-      <p:grpSpPr>
-        <a:xfrm>
-          <a:off x="0" y="0"/>
-          <a:ext cx="0" cy="0"/>
-          <a:chOff x="0" y="0"/>
-          <a:chExt cx="0" cy="0"/>
-        </a:xfrm>
-      </p:grpSpPr>
-      <p:sp>
-        <p:nvSpPr>
-          <p:cNvPr id="2" name="Titel 1">
-            <a:extLst>
-              <a:ext uri="{FF2B5EF4-FFF2-40B4-BE49-F238E27FC236}">
-                <a16:creationId xmlns:a16="http://schemas.microsoft.com/office/drawing/2014/main" id="{5803B18A-F36F-08C7-B620-C08FA27E2E54}"/>
-              </a:ext>
-            </a:extLst>
-          </p:cNvPr>
-          <p:cNvSpPr>
-            <a:spLocks noGrp="1"/>
-          </p:cNvSpPr>
-          <p:nvPr>
-            <p:ph type="title"/>
-          </p:nvPr>
-        </p:nvSpPr>
-        <p:spPr/>
-        <p:txBody>
-          <a:bodyPr/>
-          <a:lstStyle/>
-          <a:p>
-            <a:r>
-              <a:rPr lang="de-AT" dirty="0"/>
-              <a:t>Spike-Story – „Discovery-Mode“</a:t>
-            </a:r>
-          </a:p>
-        </p:txBody>
-      </p:sp>
-      <p:sp>
-        <p:nvSpPr>
-          <p:cNvPr id="3" name="Inhaltsplatzhalter 2">
-            <a:extLst>
-              <a:ext uri="{FF2B5EF4-FFF2-40B4-BE49-F238E27FC236}">
-                <a16:creationId xmlns:a16="http://schemas.microsoft.com/office/drawing/2014/main" id="{CC72A9FA-848B-2740-6D96-BA53A545324E}"/>
-              </a:ext>
-            </a:extLst>
-          </p:cNvPr>
-          <p:cNvSpPr>
-            <a:spLocks noGrp="1"/>
-          </p:cNvSpPr>
-          <p:nvPr>
-            <p:ph idx="1"/>
-          </p:nvPr>
-        </p:nvSpPr>
-        <p:spPr/>
-        <p:txBody>
-          <a:bodyPr>
-            <a:normAutofit/>
-          </a:bodyPr>
-          <a:lstStyle/>
-          <a:p>
-            <a:pPr marL="0" indent="0">
-              <a:buNone/>
-            </a:pPr>
-            <a:r>
-              <a:rPr lang="de-AT" sz="2400" b="1" dirty="0"/>
-              <a:t>Timeboxing</a:t>
-            </a:r>
-          </a:p>
-          <a:p>
-            <a:r>
-              <a:rPr lang="de-AT" sz="1900" dirty="0"/>
-              <a:t>3 Wochen für Algorithmus zum Abfahren der Strecke, Sammeln der Daten (Sensor) und Karten-Mapping  </a:t>
-            </a:r>
-          </a:p>
-          <a:p>
-            <a:pPr marL="0" indent="0">
-              <a:buNone/>
-            </a:pPr>
-            <a:r>
-              <a:rPr lang="de-AT" sz="2400" b="1" dirty="0"/>
-              <a:t>Prototypen / Variantenbildung</a:t>
-            </a:r>
-          </a:p>
-          <a:p>
-            <a:r>
-              <a:rPr lang="de-AT" sz="1900" b="1" dirty="0"/>
-              <a:t> </a:t>
-            </a:r>
-            <a:r>
-              <a:rPr lang="de-AT" sz="1900" dirty="0"/>
-              <a:t>BFS (Breitensuche)</a:t>
-            </a:r>
-          </a:p>
-          <a:p>
-            <a:r>
-              <a:rPr lang="de-AT" sz="1900" dirty="0"/>
-              <a:t> DFS (Tiefensuche)</a:t>
-            </a:r>
-          </a:p>
-          <a:p>
-            <a:r>
-              <a:rPr lang="de-AT" sz="1900" dirty="0"/>
-              <a:t> A</a:t>
-            </a:r>
-            <a:r>
-              <a:rPr lang="de-DE" sz="1900" dirty="0"/>
-              <a:t>(A-Stern)</a:t>
-            </a:r>
-            <a:r>
-              <a:rPr lang="de-AT" sz="1900" dirty="0"/>
-              <a:t>*</a:t>
-            </a:r>
-          </a:p>
-          <a:p>
-            <a:r>
-              <a:rPr lang="de-AT" sz="1900" dirty="0"/>
-              <a:t> </a:t>
-            </a:r>
-            <a:r>
-              <a:rPr lang="de-DE" sz="1900" dirty="0"/>
-              <a:t>Neander Förmig</a:t>
-            </a:r>
-            <a:endParaRPr lang="de-AT" sz="1900" b="1" dirty="0"/>
-          </a:p>
-          <a:p>
-            <a:pPr marL="0" indent="0">
-              <a:buNone/>
-            </a:pPr>
-            <a:r>
-              <a:rPr lang="de-AT" sz="2400" b="1" dirty="0"/>
-              <a:t>Lösungsansatze</a:t>
-            </a:r>
-          </a:p>
-          <a:p>
-            <a:r>
-              <a:rPr lang="de-AT" sz="1900" dirty="0"/>
-              <a:t>Alte Ansätze wurden verworfen -&gt; zu kompliziert</a:t>
-            </a:r>
-          </a:p>
-          <a:p>
-            <a:r>
-              <a:rPr lang="de-AT" sz="1900" dirty="0"/>
-              <a:t>Herr Prof. Aigner-Ansatz verwendet -&gt; SLAM-Ansatz</a:t>
-            </a:r>
-          </a:p>
-          <a:p>
-            <a:pPr marL="0" indent="0">
-              <a:buNone/>
-            </a:pPr>
-            <a:endParaRPr lang="de-AT" sz="2000" dirty="0"/>
-          </a:p>
-          <a:p>
-            <a:endParaRPr lang="de-AT" sz="2000" dirty="0"/>
-          </a:p>
-          <a:p>
-            <a:pPr marL="0" indent="0">
-              <a:buNone/>
-            </a:pPr>
-            <a:endParaRPr lang="de-AT" sz="2400" b="1" dirty="0"/>
-          </a:p>
-          <a:p>
-            <a:pPr marL="0" indent="0">
-              <a:buNone/>
-            </a:pPr>
-            <a:endParaRPr lang="de-AT" sz="2400" b="1" dirty="0"/>
-          </a:p>
-        </p:txBody>
-      </p:sp>
-      <p:sp>
-        <p:nvSpPr>
-          <p:cNvPr id="4" name="Fußzeilenplatzhalter 3">
-            <a:extLst>
-              <a:ext uri="{FF2B5EF4-FFF2-40B4-BE49-F238E27FC236}">
-                <a16:creationId xmlns:a16="http://schemas.microsoft.com/office/drawing/2014/main" id="{06AD5292-0EDF-8AD0-CDB4-D5CA095C0898}"/>
-              </a:ext>
-            </a:extLst>
-          </p:cNvPr>
-          <p:cNvSpPr>
-            <a:spLocks noGrp="1"/>
-          </p:cNvSpPr>
-          <p:nvPr>
-            <p:ph type="ftr" sz="quarter" idx="11"/>
-          </p:nvPr>
-        </p:nvSpPr>
-        <p:spPr/>
-        <p:txBody>
-          <a:bodyPr/>
-          <a:lstStyle/>
-          <a:p>
-            <a:pPr>
-              <a:defRPr/>
-            </a:pPr>
-            <a:r>
-              <a:rPr lang="de-DE"/>
-              <a:t>DI(FH) Falkensteiner Markus</a:t>
-            </a:r>
-          </a:p>
-        </p:txBody>
-      </p:sp>
-      <p:sp>
-        <p:nvSpPr>
-          <p:cNvPr id="5" name="Foliennummernplatzhalter 4">
-            <a:extLst>
-              <a:ext uri="{FF2B5EF4-FFF2-40B4-BE49-F238E27FC236}">
-                <a16:creationId xmlns:a16="http://schemas.microsoft.com/office/drawing/2014/main" id="{93C5FC72-C180-563A-216A-63A471935926}"/>
-              </a:ext>
-            </a:extLst>
-          </p:cNvPr>
-          <p:cNvSpPr>
-            <a:spLocks noGrp="1"/>
-          </p:cNvSpPr>
-          <p:nvPr>
-            <p:ph type="sldNum" sz="quarter" idx="12"/>
-          </p:nvPr>
-        </p:nvSpPr>
-        <p:spPr/>
-        <p:txBody>
-          <a:bodyPr/>
-          <a:lstStyle/>
-          <a:p>
-            <a:pPr>
-              <a:defRPr/>
-            </a:pPr>
-            <a:fld id="{AE4538FE-AEB4-413B-B741-EC1BAEEF6B8F}" type="slidenum">
-              <a:rPr lang="de-AT" smtClean="0"/>
-              <a:t>9</a:t>
-            </a:fld>
-            <a:endParaRPr lang="de-AT"/>
-          </a:p>
-        </p:txBody>
-      </p:sp>
-    </p:spTree>
-    <p:extLst>
-      <p:ext uri="{BB962C8B-B14F-4D97-AF65-F5344CB8AC3E}">
-        <p14:creationId xmlns:p14="http://schemas.microsoft.com/office/powerpoint/2010/main" val="95285380"/>
-      </p:ext>
-    </p:extLst>
-  </p:cSld>
-  <p:clrMapOvr>
-    <a:masterClrMapping/>
-  </p:clrMapOvr>
 </p:sld>
 </file>
 
@@ -13723,18 +14142,18 @@
 </file>
 
 <file path=customXml/item1.xml><?xml version="1.0" encoding="utf-8"?>
-<p:properties xmlns:p="http://schemas.microsoft.com/office/2006/metadata/properties" xmlns:xsi="http://www.w3.org/2001/XMLSchema-instance" xmlns:pc="http://schemas.microsoft.com/office/infopath/2007/PartnerControls">
-  <documentManagement/>
-</p:properties>
-</file>
-
-<file path=customXml/item2.xml><?xml version="1.0" encoding="utf-8"?>
 <?mso-contentType ?>
 <FormTemplates xmlns="http://schemas.microsoft.com/sharepoint/v3/contenttype/forms">
   <Display>DocumentLibraryForm</Display>
   <Edit>DocumentLibraryForm</Edit>
   <New>DocumentLibraryForm</New>
 </FormTemplates>
+</file>
+
+<file path=customXml/item2.xml><?xml version="1.0" encoding="utf-8"?>
+<p:properties xmlns:p="http://schemas.microsoft.com/office/2006/metadata/properties" xmlns:xsi="http://www.w3.org/2001/XMLSchema-instance" xmlns:pc="http://schemas.microsoft.com/office/infopath/2007/PartnerControls">
+  <documentManagement/>
+</p:properties>
 </file>
 
 <file path=customXml/item3.xml><?xml version="1.0" encoding="utf-8"?>
@@ -13882,6 +14301,14 @@
 </file>
 
 <file path=customXml/itemProps1.xml><?xml version="1.0" encoding="utf-8"?>
+<ds:datastoreItem xmlns:ds="http://schemas.openxmlformats.org/officeDocument/2006/customXml" ds:itemID="{1981A0EB-802E-4D0E-9A2A-3AE4F15204D8}">
+  <ds:schemaRefs>
+    <ds:schemaRef ds:uri="http://schemas.microsoft.com/sharepoint/v3/contenttype/forms"/>
+  </ds:schemaRefs>
+</ds:datastoreItem>
+</file>
+
+<file path=customXml/itemProps2.xml><?xml version="1.0" encoding="utf-8"?>
 <ds:datastoreItem xmlns:ds="http://schemas.openxmlformats.org/officeDocument/2006/customXml" ds:itemID="{8354EFAF-31A0-41ED-A74D-DAE704B6C081}">
   <ds:schemaRefs>
     <ds:schemaRef ds:uri="http://schemas.openxmlformats.org/package/2006/metadata/core-properties"/>
@@ -13893,14 +14320,6 @@
     <ds:schemaRef ds:uri="http://schemas.microsoft.com/office/2006/metadata/properties"/>
     <ds:schemaRef ds:uri="http://purl.org/dc/dcmitype/"/>
     <ds:schemaRef ds:uri="http://purl.org/dc/terms/"/>
-  </ds:schemaRefs>
-</ds:datastoreItem>
-</file>
-
-<file path=customXml/itemProps2.xml><?xml version="1.0" encoding="utf-8"?>
-<ds:datastoreItem xmlns:ds="http://schemas.openxmlformats.org/officeDocument/2006/customXml" ds:itemID="{1981A0EB-802E-4D0E-9A2A-3AE4F15204D8}">
-  <ds:schemaRefs>
-    <ds:schemaRef ds:uri="http://schemas.microsoft.com/sharepoint/v3/contenttype/forms"/>
   </ds:schemaRefs>
 </ds:datastoreItem>
 </file>

</xml_diff>